<commit_message>
Update Creo CSYS Methodology.pptx
</commit_message>
<xml_diff>
--- a/Creo CSYS Methodology.pptx
+++ b/Creo CSYS Methodology.pptx
@@ -12,7 +12,11 @@
     <p:sldId id="260" r:id="rId6"/>
     <p:sldId id="259" r:id="rId7"/>
     <p:sldId id="264" r:id="rId8"/>
-    <p:sldId id="263" r:id="rId9"/>
+    <p:sldId id="265" r:id="rId9"/>
+    <p:sldId id="270" r:id="rId10"/>
+    <p:sldId id="269" r:id="rId11"/>
+    <p:sldId id="268" r:id="rId12"/>
+    <p:sldId id="263" r:id="rId13"/>
   </p:sldIdLst>
   <p:sldSz cx="12192000" cy="6858000"/>
   <p:notesSz cx="6858000" cy="9144000"/>
@@ -122,8 +126,10 @@
 <file path=ppt/revisionInfo.xml><?xml version="1.0" encoding="utf-8"?>
 <p1510:revInfo xmlns:a="http://schemas.openxmlformats.org/drawingml/2006/main" xmlns:r="http://schemas.openxmlformats.org/officeDocument/2006/relationships" xmlns:p1510="http://schemas.microsoft.com/office/powerpoint/2015/10/main">
   <p1510:revLst>
-    <p1510:client id="{86DBD92B-579E-B8D3-6463-83F6FBCFF2A4}" v="21" dt="2024-06-26T18:23:00.870"/>
-    <p1510:client id="{9AF01AAD-13AE-AB2B-25E3-7727BC5752FC}" v="1" dt="2024-06-26T20:22:03.970"/>
+    <p1510:client id="{08B5C88A-65E0-5FB3-462B-10632AF4ACF9}" v="89" dt="2024-07-16T18:28:33.922"/>
+    <p1510:client id="{36EA0625-1292-9CC0-9771-6523B053E64A}" v="368" dt="2024-07-17T18:23:47.956"/>
+    <p1510:client id="{63A614F8-B410-11D6-1D53-83AB9873DB1E}" v="14" dt="2024-07-17T17:47:49.979"/>
+    <p1510:client id="{8E9096EB-EEE5-3570-E8CD-668210CECC0B}" v="54" dt="2024-07-16T13:20:48.080"/>
   </p1510:revLst>
 </p1510:revInfo>
 </file>
@@ -218,6 +224,215 @@
     </pc:docChg>
   </pc:docChgLst>
   <pc:docChgLst>
+    <pc:chgData name="Justin Jones" userId="S::justin.jones@cnpcusa.com::d548d167-3381-4d70-866b-4efa696e272f" providerId="AD" clId="Web-{08B5C88A-65E0-5FB3-462B-10632AF4ACF9}"/>
+    <pc:docChg chg="addSld modSld">
+      <pc:chgData name="Justin Jones" userId="S::justin.jones@cnpcusa.com::d548d167-3381-4d70-866b-4efa696e272f" providerId="AD" clId="Web-{08B5C88A-65E0-5FB3-462B-10632AF4ACF9}" dt="2024-07-16T18:28:33.922" v="85" actId="1076"/>
+      <pc:docMkLst>
+        <pc:docMk/>
+      </pc:docMkLst>
+      <pc:sldChg chg="delSp modSp">
+        <pc:chgData name="Justin Jones" userId="S::justin.jones@cnpcusa.com::d548d167-3381-4d70-866b-4efa696e272f" providerId="AD" clId="Web-{08B5C88A-65E0-5FB3-462B-10632AF4ACF9}" dt="2024-07-16T18:28:25.079" v="81" actId="20577"/>
+        <pc:sldMkLst>
+          <pc:docMk/>
+          <pc:sldMk cId="2238481522" sldId="259"/>
+        </pc:sldMkLst>
+        <pc:spChg chg="mod">
+          <ac:chgData name="Justin Jones" userId="S::justin.jones@cnpcusa.com::d548d167-3381-4d70-866b-4efa696e272f" providerId="AD" clId="Web-{08B5C88A-65E0-5FB3-462B-10632AF4ACF9}" dt="2024-07-16T18:28:25.079" v="81" actId="20577"/>
+          <ac:spMkLst>
+            <pc:docMk/>
+            <pc:sldMk cId="2238481522" sldId="259"/>
+            <ac:spMk id="3" creationId="{5BFDA1E2-DACB-B107-DE39-D2A1201C9AA5}"/>
+          </ac:spMkLst>
+        </pc:spChg>
+        <pc:picChg chg="mod">
+          <ac:chgData name="Justin Jones" userId="S::justin.jones@cnpcusa.com::d548d167-3381-4d70-866b-4efa696e272f" providerId="AD" clId="Web-{08B5C88A-65E0-5FB3-462B-10632AF4ACF9}" dt="2024-07-16T18:27:51.141" v="76" actId="1076"/>
+          <ac:picMkLst>
+            <pc:docMk/>
+            <pc:sldMk cId="2238481522" sldId="259"/>
+            <ac:picMk id="4" creationId="{4386DFF2-9920-DF5C-FB69-8A6367C808C4}"/>
+          </ac:picMkLst>
+        </pc:picChg>
+        <pc:picChg chg="del">
+          <ac:chgData name="Justin Jones" userId="S::justin.jones@cnpcusa.com::d548d167-3381-4d70-866b-4efa696e272f" providerId="AD" clId="Web-{08B5C88A-65E0-5FB3-462B-10632AF4ACF9}" dt="2024-07-16T14:31:39.160" v="0"/>
+          <ac:picMkLst>
+            <pc:docMk/>
+            <pc:sldMk cId="2238481522" sldId="259"/>
+            <ac:picMk id="5" creationId="{5765FC7B-9EBF-5245-5A22-44D2599BD9AF}"/>
+          </ac:picMkLst>
+        </pc:picChg>
+      </pc:sldChg>
+      <pc:sldChg chg="modSp">
+        <pc:chgData name="Justin Jones" userId="S::justin.jones@cnpcusa.com::d548d167-3381-4d70-866b-4efa696e272f" providerId="AD" clId="Web-{08B5C88A-65E0-5FB3-462B-10632AF4ACF9}" dt="2024-07-16T18:28:33.922" v="85" actId="1076"/>
+        <pc:sldMkLst>
+          <pc:docMk/>
+          <pc:sldMk cId="3616584397" sldId="260"/>
+        </pc:sldMkLst>
+        <pc:spChg chg="mod">
+          <ac:chgData name="Justin Jones" userId="S::justin.jones@cnpcusa.com::d548d167-3381-4d70-866b-4efa696e272f" providerId="AD" clId="Web-{08B5C88A-65E0-5FB3-462B-10632AF4ACF9}" dt="2024-07-16T18:28:33.922" v="85" actId="1076"/>
+          <ac:spMkLst>
+            <pc:docMk/>
+            <pc:sldMk cId="3616584397" sldId="260"/>
+            <ac:spMk id="5" creationId="{BECC5715-81E0-AD2F-9298-7F3DB4ED3E3B}"/>
+          </ac:spMkLst>
+        </pc:spChg>
+        <pc:spChg chg="mod">
+          <ac:chgData name="Justin Jones" userId="S::justin.jones@cnpcusa.com::d548d167-3381-4d70-866b-4efa696e272f" providerId="AD" clId="Web-{08B5C88A-65E0-5FB3-462B-10632AF4ACF9}" dt="2024-07-16T18:28:33.907" v="83" actId="1076"/>
+          <ac:spMkLst>
+            <pc:docMk/>
+            <pc:sldMk cId="3616584397" sldId="260"/>
+            <ac:spMk id="10" creationId="{4D970A9A-4EB7-89C3-45BF-1B9A9A3EACF0}"/>
+          </ac:spMkLst>
+        </pc:spChg>
+        <pc:picChg chg="mod">
+          <ac:chgData name="Justin Jones" userId="S::justin.jones@cnpcusa.com::d548d167-3381-4d70-866b-4efa696e272f" providerId="AD" clId="Web-{08B5C88A-65E0-5FB3-462B-10632AF4ACF9}" dt="2024-07-16T18:28:33.922" v="84" actId="1076"/>
+          <ac:picMkLst>
+            <pc:docMk/>
+            <pc:sldMk cId="3616584397" sldId="260"/>
+            <ac:picMk id="4" creationId="{02C6D318-A858-580D-2E63-7BF688FFBB06}"/>
+          </ac:picMkLst>
+        </pc:picChg>
+        <pc:picChg chg="mod">
+          <ac:chgData name="Justin Jones" userId="S::justin.jones@cnpcusa.com::d548d167-3381-4d70-866b-4efa696e272f" providerId="AD" clId="Web-{08B5C88A-65E0-5FB3-462B-10632AF4ACF9}" dt="2024-07-16T18:28:33.891" v="82" actId="1076"/>
+          <ac:picMkLst>
+            <pc:docMk/>
+            <pc:sldMk cId="3616584397" sldId="260"/>
+            <ac:picMk id="9" creationId="{2CB07DCF-44A7-76DD-DFC5-7BA50974330F}"/>
+          </ac:picMkLst>
+        </pc:picChg>
+      </pc:sldChg>
+      <pc:sldChg chg="addSp delSp modSp">
+        <pc:chgData name="Justin Jones" userId="S::justin.jones@cnpcusa.com::d548d167-3381-4d70-866b-4efa696e272f" providerId="AD" clId="Web-{08B5C88A-65E0-5FB3-462B-10632AF4ACF9}" dt="2024-07-16T14:38:25.610" v="23" actId="1076"/>
+        <pc:sldMkLst>
+          <pc:docMk/>
+          <pc:sldMk cId="2903164538" sldId="264"/>
+        </pc:sldMkLst>
+        <pc:picChg chg="add del mod">
+          <ac:chgData name="Justin Jones" userId="S::justin.jones@cnpcusa.com::d548d167-3381-4d70-866b-4efa696e272f" providerId="AD" clId="Web-{08B5C88A-65E0-5FB3-462B-10632AF4ACF9}" dt="2024-07-16T14:38:17.625" v="19"/>
+          <ac:picMkLst>
+            <pc:docMk/>
+            <pc:sldMk cId="2903164538" sldId="264"/>
+            <ac:picMk id="2" creationId="{E550080C-7591-11F4-B8DA-3DE8029CE8D5}"/>
+          </ac:picMkLst>
+        </pc:picChg>
+        <pc:picChg chg="add mod">
+          <ac:chgData name="Justin Jones" userId="S::justin.jones@cnpcusa.com::d548d167-3381-4d70-866b-4efa696e272f" providerId="AD" clId="Web-{08B5C88A-65E0-5FB3-462B-10632AF4ACF9}" dt="2024-07-16T14:38:25.610" v="23" actId="1076"/>
+          <ac:picMkLst>
+            <pc:docMk/>
+            <pc:sldMk cId="2903164538" sldId="264"/>
+            <ac:picMk id="3" creationId="{F48C23A1-CB55-51BF-75CA-454EBAB2131D}"/>
+          </ac:picMkLst>
+        </pc:picChg>
+        <pc:picChg chg="add del mod">
+          <ac:chgData name="Justin Jones" userId="S::justin.jones@cnpcusa.com::d548d167-3381-4d70-866b-4efa696e272f" providerId="AD" clId="Web-{08B5C88A-65E0-5FB3-462B-10632AF4ACF9}" dt="2024-07-16T14:38:17.891" v="20"/>
+          <ac:picMkLst>
+            <pc:docMk/>
+            <pc:sldMk cId="2903164538" sldId="264"/>
+            <ac:picMk id="4" creationId="{72127ED3-17D6-977F-AD47-09BB5A0F64E1}"/>
+          </ac:picMkLst>
+        </pc:picChg>
+        <pc:picChg chg="del">
+          <ac:chgData name="Justin Jones" userId="S::justin.jones@cnpcusa.com::d548d167-3381-4d70-866b-4efa696e272f" providerId="AD" clId="Web-{08B5C88A-65E0-5FB3-462B-10632AF4ACF9}" dt="2024-07-16T14:36:09.902" v="2"/>
+          <ac:picMkLst>
+            <pc:docMk/>
+            <pc:sldMk cId="2903164538" sldId="264"/>
+            <ac:picMk id="5" creationId="{5765FC7B-9EBF-5245-5A22-44D2599BD9AF}"/>
+          </ac:picMkLst>
+        </pc:picChg>
+      </pc:sldChg>
+      <pc:sldChg chg="delSp modSp add replId">
+        <pc:chgData name="Justin Jones" userId="S::justin.jones@cnpcusa.com::d548d167-3381-4d70-866b-4efa696e272f" providerId="AD" clId="Web-{08B5C88A-65E0-5FB3-462B-10632AF4ACF9}" dt="2024-07-16T14:38:37.438" v="27" actId="14100"/>
+        <pc:sldMkLst>
+          <pc:docMk/>
+          <pc:sldMk cId="866400033" sldId="265"/>
+        </pc:sldMkLst>
+        <pc:picChg chg="mod">
+          <ac:chgData name="Justin Jones" userId="S::justin.jones@cnpcusa.com::d548d167-3381-4d70-866b-4efa696e272f" providerId="AD" clId="Web-{08B5C88A-65E0-5FB3-462B-10632AF4ACF9}" dt="2024-07-16T14:38:34.329" v="26" actId="14100"/>
+          <ac:picMkLst>
+            <pc:docMk/>
+            <pc:sldMk cId="866400033" sldId="265"/>
+            <ac:picMk id="2" creationId="{E550080C-7591-11F4-B8DA-3DE8029CE8D5}"/>
+          </ac:picMkLst>
+        </pc:picChg>
+        <pc:picChg chg="del">
+          <ac:chgData name="Justin Jones" userId="S::justin.jones@cnpcusa.com::d548d167-3381-4d70-866b-4efa696e272f" providerId="AD" clId="Web-{08B5C88A-65E0-5FB3-462B-10632AF4ACF9}" dt="2024-07-16T14:38:15.891" v="18"/>
+          <ac:picMkLst>
+            <pc:docMk/>
+            <pc:sldMk cId="866400033" sldId="265"/>
+            <ac:picMk id="3" creationId="{F48C23A1-CB55-51BF-75CA-454EBAB2131D}"/>
+          </ac:picMkLst>
+        </pc:picChg>
+        <pc:picChg chg="mod">
+          <ac:chgData name="Justin Jones" userId="S::justin.jones@cnpcusa.com::d548d167-3381-4d70-866b-4efa696e272f" providerId="AD" clId="Web-{08B5C88A-65E0-5FB3-462B-10632AF4ACF9}" dt="2024-07-16T14:38:37.438" v="27" actId="14100"/>
+          <ac:picMkLst>
+            <pc:docMk/>
+            <pc:sldMk cId="866400033" sldId="265"/>
+            <ac:picMk id="4" creationId="{72127ED3-17D6-977F-AD47-09BB5A0F64E1}"/>
+          </ac:picMkLst>
+        </pc:picChg>
+      </pc:sldChg>
+    </pc:docChg>
+  </pc:docChgLst>
+  <pc:docChgLst>
+    <pc:chgData name="Justin Jones" userId="S::justin.jones@cnpcusa.com::d548d167-3381-4d70-866b-4efa696e272f" providerId="AD" clId="Web-{63A614F8-B410-11D6-1D53-83AB9873DB1E}"/>
+    <pc:docChg chg="addSld modSld">
+      <pc:chgData name="Justin Jones" userId="S::justin.jones@cnpcusa.com::d548d167-3381-4d70-866b-4efa696e272f" providerId="AD" clId="Web-{63A614F8-B410-11D6-1D53-83AB9873DB1E}" dt="2024-07-17T17:47:47.167" v="11" actId="20577"/>
+      <pc:docMkLst>
+        <pc:docMk/>
+      </pc:docMkLst>
+      <pc:sldChg chg="add replId">
+        <pc:chgData name="Justin Jones" userId="S::justin.jones@cnpcusa.com::d548d167-3381-4d70-866b-4efa696e272f" providerId="AD" clId="Web-{63A614F8-B410-11D6-1D53-83AB9873DB1E}" dt="2024-07-17T17:47:27.619" v="0"/>
+        <pc:sldMkLst>
+          <pc:docMk/>
+          <pc:sldMk cId="2387751346" sldId="266"/>
+        </pc:sldMkLst>
+      </pc:sldChg>
+      <pc:sldChg chg="add replId">
+        <pc:chgData name="Justin Jones" userId="S::justin.jones@cnpcusa.com::d548d167-3381-4d70-866b-4efa696e272f" providerId="AD" clId="Web-{63A614F8-B410-11D6-1D53-83AB9873DB1E}" dt="2024-07-17T17:47:27.697" v="1"/>
+        <pc:sldMkLst>
+          <pc:docMk/>
+          <pc:sldMk cId="4173312039" sldId="267"/>
+        </pc:sldMkLst>
+      </pc:sldChg>
+      <pc:sldChg chg="add replId">
+        <pc:chgData name="Justin Jones" userId="S::justin.jones@cnpcusa.com::d548d167-3381-4d70-866b-4efa696e272f" providerId="AD" clId="Web-{63A614F8-B410-11D6-1D53-83AB9873DB1E}" dt="2024-07-17T17:47:27.760" v="2"/>
+        <pc:sldMkLst>
+          <pc:docMk/>
+          <pc:sldMk cId="2890609912" sldId="268"/>
+        </pc:sldMkLst>
+      </pc:sldChg>
+      <pc:sldChg chg="modSp add replId">
+        <pc:chgData name="Justin Jones" userId="S::justin.jones@cnpcusa.com::d548d167-3381-4d70-866b-4efa696e272f" providerId="AD" clId="Web-{63A614F8-B410-11D6-1D53-83AB9873DB1E}" dt="2024-07-17T17:47:47.167" v="11" actId="20577"/>
+        <pc:sldMkLst>
+          <pc:docMk/>
+          <pc:sldMk cId="341063258" sldId="269"/>
+        </pc:sldMkLst>
+        <pc:spChg chg="mod">
+          <ac:chgData name="Justin Jones" userId="S::justin.jones@cnpcusa.com::d548d167-3381-4d70-866b-4efa696e272f" providerId="AD" clId="Web-{63A614F8-B410-11D6-1D53-83AB9873DB1E}" dt="2024-07-17T17:47:47.167" v="11" actId="20577"/>
+          <ac:spMkLst>
+            <pc:docMk/>
+            <pc:sldMk cId="341063258" sldId="269"/>
+            <ac:spMk id="2" creationId="{1F6332E9-69BB-1518-20B0-503139146C67}"/>
+          </ac:spMkLst>
+        </pc:spChg>
+      </pc:sldChg>
+      <pc:sldChg chg="modSp add replId">
+        <pc:chgData name="Justin Jones" userId="S::justin.jones@cnpcusa.com::d548d167-3381-4d70-866b-4efa696e272f" providerId="AD" clId="Web-{63A614F8-B410-11D6-1D53-83AB9873DB1E}" dt="2024-07-17T17:47:33.604" v="6" actId="20577"/>
+        <pc:sldMkLst>
+          <pc:docMk/>
+          <pc:sldMk cId="3310921234" sldId="270"/>
+        </pc:sldMkLst>
+        <pc:spChg chg="mod">
+          <ac:chgData name="Justin Jones" userId="S::justin.jones@cnpcusa.com::d548d167-3381-4d70-866b-4efa696e272f" providerId="AD" clId="Web-{63A614F8-B410-11D6-1D53-83AB9873DB1E}" dt="2024-07-17T17:47:33.604" v="6" actId="20577"/>
+          <ac:spMkLst>
+            <pc:docMk/>
+            <pc:sldMk cId="3310921234" sldId="270"/>
+            <ac:spMk id="2" creationId="{00000000-0000-0000-0000-000000000000}"/>
+          </ac:spMkLst>
+        </pc:spChg>
+      </pc:sldChg>
+    </pc:docChg>
+  </pc:docChgLst>
+  <pc:docChgLst>
     <pc:chgData name="Justin Jones" userId="S::justin.jones@cnpcusa.com::d548d167-3381-4d70-866b-4efa696e272f" providerId="AD" clId="Web-{46E7473C-A54D-DEB8-9286-7FF1F650F8FA}"/>
     <pc:docChg chg="modSld">
       <pc:chgData name="Justin Jones" userId="S::justin.jones@cnpcusa.com::d548d167-3381-4d70-866b-4efa696e272f" providerId="AD" clId="Web-{46E7473C-A54D-DEB8-9286-7FF1F650F8FA}" dt="2024-06-13T21:22:01.552" v="3"/>
@@ -266,6 +481,69 @@
     </pc:docChg>
   </pc:docChgLst>
   <pc:docChgLst>
+    <pc:chgData name="Justin Jones" userId="S::justin.jones@cnpcusa.com::d548d167-3381-4d70-866b-4efa696e272f" providerId="AD" clId="Web-{8E9096EB-EEE5-3570-E8CD-668210CECC0B}"/>
+    <pc:docChg chg="modSld">
+      <pc:chgData name="Justin Jones" userId="S::justin.jones@cnpcusa.com::d548d167-3381-4d70-866b-4efa696e272f" providerId="AD" clId="Web-{8E9096EB-EEE5-3570-E8CD-668210CECC0B}" dt="2024-07-16T13:20:48.080" v="50" actId="20577"/>
+      <pc:docMkLst>
+        <pc:docMk/>
+      </pc:docMkLst>
+      <pc:sldChg chg="modSp">
+        <pc:chgData name="Justin Jones" userId="S::justin.jones@cnpcusa.com::d548d167-3381-4d70-866b-4efa696e272f" providerId="AD" clId="Web-{8E9096EB-EEE5-3570-E8CD-668210CECC0B}" dt="2024-07-16T13:06:56.347" v="18" actId="20577"/>
+        <pc:sldMkLst>
+          <pc:docMk/>
+          <pc:sldMk cId="2238481522" sldId="259"/>
+        </pc:sldMkLst>
+        <pc:spChg chg="mod">
+          <ac:chgData name="Justin Jones" userId="S::justin.jones@cnpcusa.com::d548d167-3381-4d70-866b-4efa696e272f" providerId="AD" clId="Web-{8E9096EB-EEE5-3570-E8CD-668210CECC0B}" dt="2024-07-16T13:06:56.347" v="18" actId="20577"/>
+          <ac:spMkLst>
+            <pc:docMk/>
+            <pc:sldMk cId="2238481522" sldId="259"/>
+            <ac:spMk id="3" creationId="{5BFDA1E2-DACB-B107-DE39-D2A1201C9AA5}"/>
+          </ac:spMkLst>
+        </pc:spChg>
+      </pc:sldChg>
+      <pc:sldChg chg="addSp modSp">
+        <pc:chgData name="Justin Jones" userId="S::justin.jones@cnpcusa.com::d548d167-3381-4d70-866b-4efa696e272f" providerId="AD" clId="Web-{8E9096EB-EEE5-3570-E8CD-668210CECC0B}" dt="2024-07-16T13:20:48.080" v="50" actId="20577"/>
+        <pc:sldMkLst>
+          <pc:docMk/>
+          <pc:sldMk cId="3616584397" sldId="260"/>
+        </pc:sldMkLst>
+        <pc:spChg chg="mod">
+          <ac:chgData name="Justin Jones" userId="S::justin.jones@cnpcusa.com::d548d167-3381-4d70-866b-4efa696e272f" providerId="AD" clId="Web-{8E9096EB-EEE5-3570-E8CD-668210CECC0B}" dt="2024-07-16T13:20:48.080" v="50" actId="20577"/>
+          <ac:spMkLst>
+            <pc:docMk/>
+            <pc:sldMk cId="3616584397" sldId="260"/>
+            <ac:spMk id="3" creationId="{5BFDA1E2-DACB-B107-DE39-D2A1201C9AA5}"/>
+          </ac:spMkLst>
+        </pc:spChg>
+        <pc:spChg chg="add mod">
+          <ac:chgData name="Justin Jones" userId="S::justin.jones@cnpcusa.com::d548d167-3381-4d70-866b-4efa696e272f" providerId="AD" clId="Web-{8E9096EB-EEE5-3570-E8CD-668210CECC0B}" dt="2024-07-16T13:09:58.228" v="26" actId="1076"/>
+          <ac:spMkLst>
+            <pc:docMk/>
+            <pc:sldMk cId="3616584397" sldId="260"/>
+            <ac:spMk id="5" creationId="{BECC5715-81E0-AD2F-9298-7F3DB4ED3E3B}"/>
+          </ac:spMkLst>
+        </pc:spChg>
+        <pc:spChg chg="mod">
+          <ac:chgData name="Justin Jones" userId="S::justin.jones@cnpcusa.com::d548d167-3381-4d70-866b-4efa696e272f" providerId="AD" clId="Web-{8E9096EB-EEE5-3570-E8CD-668210CECC0B}" dt="2024-07-16T13:09:58.228" v="27" actId="1076"/>
+          <ac:spMkLst>
+            <pc:docMk/>
+            <pc:sldMk cId="3616584397" sldId="260"/>
+            <ac:spMk id="10" creationId="{4D970A9A-4EB7-89C3-45BF-1B9A9A3EACF0}"/>
+          </ac:spMkLst>
+        </pc:spChg>
+        <pc:picChg chg="add mod">
+          <ac:chgData name="Justin Jones" userId="S::justin.jones@cnpcusa.com::d548d167-3381-4d70-866b-4efa696e272f" providerId="AD" clId="Web-{8E9096EB-EEE5-3570-E8CD-668210CECC0B}" dt="2024-07-16T13:09:39.853" v="21" actId="14100"/>
+          <ac:picMkLst>
+            <pc:docMk/>
+            <pc:sldMk cId="3616584397" sldId="260"/>
+            <ac:picMk id="4" creationId="{02C6D318-A858-580D-2E63-7BF688FFBB06}"/>
+          </ac:picMkLst>
+        </pc:picChg>
+      </pc:sldChg>
+    </pc:docChg>
+  </pc:docChgLst>
+  <pc:docChgLst>
     <pc:chgData name="Justin Jones" userId="S::justin.jones@cnpcusa.com::d548d167-3381-4d70-866b-4efa696e272f" providerId="AD" clId="Web-{9AF01AAD-13AE-AB2B-25E3-7727BC5752FC}"/>
     <pc:docChg chg="delSld">
       <pc:chgData name="Justin Jones" userId="S::justin.jones@cnpcusa.com::d548d167-3381-4d70-866b-4efa696e272f" providerId="AD" clId="Web-{9AF01AAD-13AE-AB2B-25E3-7727BC5752FC}" dt="2024-06-26T20:22:03.970" v="0"/>
@@ -278,6 +556,203 @@
           <pc:docMk/>
           <pc:sldMk cId="3114397265" sldId="257"/>
         </pc:sldMkLst>
+      </pc:sldChg>
+    </pc:docChg>
+  </pc:docChgLst>
+  <pc:docChgLst>
+    <pc:chgData name="Justin Jones" userId="S::justin.jones@cnpcusa.com::d548d167-3381-4d70-866b-4efa696e272f" providerId="AD" clId="Web-{36EA0625-1292-9CC0-9771-6523B053E64A}"/>
+    <pc:docChg chg="delSld modSld">
+      <pc:chgData name="Justin Jones" userId="S::justin.jones@cnpcusa.com::d548d167-3381-4d70-866b-4efa696e272f" providerId="AD" clId="Web-{36EA0625-1292-9CC0-9771-6523B053E64A}" dt="2024-07-17T18:23:47.956" v="327"/>
+      <pc:docMkLst>
+        <pc:docMk/>
+      </pc:docMkLst>
+      <pc:sldChg chg="del">
+        <pc:chgData name="Justin Jones" userId="S::justin.jones@cnpcusa.com::d548d167-3381-4d70-866b-4efa696e272f" providerId="AD" clId="Web-{36EA0625-1292-9CC0-9771-6523B053E64A}" dt="2024-07-17T18:22:40.516" v="316"/>
+        <pc:sldMkLst>
+          <pc:docMk/>
+          <pc:sldMk cId="2387751346" sldId="266"/>
+        </pc:sldMkLst>
+      </pc:sldChg>
+      <pc:sldChg chg="del">
+        <pc:chgData name="Justin Jones" userId="S::justin.jones@cnpcusa.com::d548d167-3381-4d70-866b-4efa696e272f" providerId="AD" clId="Web-{36EA0625-1292-9CC0-9771-6523B053E64A}" dt="2024-07-17T18:22:39.453" v="315"/>
+        <pc:sldMkLst>
+          <pc:docMk/>
+          <pc:sldMk cId="4173312039" sldId="267"/>
+        </pc:sldMkLst>
+      </pc:sldChg>
+      <pc:sldChg chg="addSp delSp modSp">
+        <pc:chgData name="Justin Jones" userId="S::justin.jones@cnpcusa.com::d548d167-3381-4d70-866b-4efa696e272f" providerId="AD" clId="Web-{36EA0625-1292-9CC0-9771-6523B053E64A}" dt="2024-07-17T18:20:10.619" v="314" actId="14100"/>
+        <pc:sldMkLst>
+          <pc:docMk/>
+          <pc:sldMk cId="2890609912" sldId="268"/>
+        </pc:sldMkLst>
+        <pc:spChg chg="mod">
+          <ac:chgData name="Justin Jones" userId="S::justin.jones@cnpcusa.com::d548d167-3381-4d70-866b-4efa696e272f" providerId="AD" clId="Web-{36EA0625-1292-9CC0-9771-6523B053E64A}" dt="2024-07-17T18:19:58.931" v="312" actId="14100"/>
+          <ac:spMkLst>
+            <pc:docMk/>
+            <pc:sldMk cId="2890609912" sldId="268"/>
+            <ac:spMk id="2" creationId="{1F6332E9-69BB-1518-20B0-503139146C67}"/>
+          </ac:spMkLst>
+        </pc:spChg>
+        <pc:spChg chg="mod">
+          <ac:chgData name="Justin Jones" userId="S::justin.jones@cnpcusa.com::d548d167-3381-4d70-866b-4efa696e272f" providerId="AD" clId="Web-{36EA0625-1292-9CC0-9771-6523B053E64A}" dt="2024-07-17T18:19:22.602" v="304" actId="14100"/>
+          <ac:spMkLst>
+            <pc:docMk/>
+            <pc:sldMk cId="2890609912" sldId="268"/>
+            <ac:spMk id="3" creationId="{5BFDA1E2-DACB-B107-DE39-D2A1201C9AA5}"/>
+          </ac:spMkLst>
+        </pc:spChg>
+        <pc:spChg chg="add mod">
+          <ac:chgData name="Justin Jones" userId="S::justin.jones@cnpcusa.com::d548d167-3381-4d70-866b-4efa696e272f" providerId="AD" clId="Web-{36EA0625-1292-9CC0-9771-6523B053E64A}" dt="2024-07-17T18:16:11.090" v="242" actId="1076"/>
+          <ac:spMkLst>
+            <pc:docMk/>
+            <pc:sldMk cId="2890609912" sldId="268"/>
+            <ac:spMk id="6" creationId="{53950D08-E593-8FD4-F2BF-88D830465ACD}"/>
+          </ac:spMkLst>
+        </pc:spChg>
+        <pc:spChg chg="add mod">
+          <ac:chgData name="Justin Jones" userId="S::justin.jones@cnpcusa.com::d548d167-3381-4d70-866b-4efa696e272f" providerId="AD" clId="Web-{36EA0625-1292-9CC0-9771-6523B053E64A}" dt="2024-07-17T18:17:00.580" v="258" actId="1076"/>
+          <ac:spMkLst>
+            <pc:docMk/>
+            <pc:sldMk cId="2890609912" sldId="268"/>
+            <ac:spMk id="9" creationId="{B0C424A9-03CC-EB29-011B-F2A0CCBFFD7D}"/>
+          </ac:spMkLst>
+        </pc:spChg>
+        <pc:spChg chg="add mod">
+          <ac:chgData name="Justin Jones" userId="S::justin.jones@cnpcusa.com::d548d167-3381-4d70-866b-4efa696e272f" providerId="AD" clId="Web-{36EA0625-1292-9CC0-9771-6523B053E64A}" dt="2024-07-17T18:19:54.837" v="311" actId="1076"/>
+          <ac:spMkLst>
+            <pc:docMk/>
+            <pc:sldMk cId="2890609912" sldId="268"/>
+            <ac:spMk id="12" creationId="{F5B528AF-8B99-293B-67B0-C0568F9BF972}"/>
+          </ac:spMkLst>
+        </pc:spChg>
+        <pc:picChg chg="del">
+          <ac:chgData name="Justin Jones" userId="S::justin.jones@cnpcusa.com::d548d167-3381-4d70-866b-4efa696e272f" providerId="AD" clId="Web-{36EA0625-1292-9CC0-9771-6523B053E64A}" dt="2024-07-17T18:05:45.097" v="211"/>
+          <ac:picMkLst>
+            <pc:docMk/>
+            <pc:sldMk cId="2890609912" sldId="268"/>
+            <ac:picMk id="4" creationId="{4386DFF2-9920-DF5C-FB69-8A6367C808C4}"/>
+          </ac:picMkLst>
+        </pc:picChg>
+        <pc:picChg chg="add mod ord">
+          <ac:chgData name="Justin Jones" userId="S::justin.jones@cnpcusa.com::d548d167-3381-4d70-866b-4efa696e272f" providerId="AD" clId="Web-{36EA0625-1292-9CC0-9771-6523B053E64A}" dt="2024-07-17T18:19:04.492" v="301"/>
+          <ac:picMkLst>
+            <pc:docMk/>
+            <pc:sldMk cId="2890609912" sldId="268"/>
+            <ac:picMk id="5" creationId="{09164FC3-2305-B7E8-9DAD-555E492634F0}"/>
+          </ac:picMkLst>
+        </pc:picChg>
+        <pc:cxnChg chg="add mod">
+          <ac:chgData name="Justin Jones" userId="S::justin.jones@cnpcusa.com::d548d167-3381-4d70-866b-4efa696e272f" providerId="AD" clId="Web-{36EA0625-1292-9CC0-9771-6523B053E64A}" dt="2024-07-17T18:16:26.579" v="246"/>
+          <ac:cxnSpMkLst>
+            <pc:docMk/>
+            <pc:sldMk cId="2890609912" sldId="268"/>
+            <ac:cxnSpMk id="7" creationId="{7B93B970-EE7E-B1D4-5F0B-5A6B567FBB67}"/>
+          </ac:cxnSpMkLst>
+        </pc:cxnChg>
+        <pc:cxnChg chg="add mod">
+          <ac:chgData name="Justin Jones" userId="S::justin.jones@cnpcusa.com::d548d167-3381-4d70-866b-4efa696e272f" providerId="AD" clId="Web-{36EA0625-1292-9CC0-9771-6523B053E64A}" dt="2024-07-17T18:16:40.548" v="250" actId="14100"/>
+          <ac:cxnSpMkLst>
+            <pc:docMk/>
+            <pc:sldMk cId="2890609912" sldId="268"/>
+            <ac:cxnSpMk id="8" creationId="{78AEA6CA-9F4B-D46A-1E56-AE257FD8EE16}"/>
+          </ac:cxnSpMkLst>
+        </pc:cxnChg>
+        <pc:cxnChg chg="add mod">
+          <ac:chgData name="Justin Jones" userId="S::justin.jones@cnpcusa.com::d548d167-3381-4d70-866b-4efa696e272f" providerId="AD" clId="Web-{36EA0625-1292-9CC0-9771-6523B053E64A}" dt="2024-07-17T18:17:09.050" v="261" actId="14100"/>
+          <ac:cxnSpMkLst>
+            <pc:docMk/>
+            <pc:sldMk cId="2890609912" sldId="268"/>
+            <ac:cxnSpMk id="10" creationId="{B58946CE-D297-A493-FEC2-0D54F76190F6}"/>
+          </ac:cxnSpMkLst>
+        </pc:cxnChg>
+        <pc:cxnChg chg="add mod">
+          <ac:chgData name="Justin Jones" userId="S::justin.jones@cnpcusa.com::d548d167-3381-4d70-866b-4efa696e272f" providerId="AD" clId="Web-{36EA0625-1292-9CC0-9771-6523B053E64A}" dt="2024-07-17T18:17:22.097" v="264" actId="14100"/>
+          <ac:cxnSpMkLst>
+            <pc:docMk/>
+            <pc:sldMk cId="2890609912" sldId="268"/>
+            <ac:cxnSpMk id="11" creationId="{04B17C7D-43F4-29A8-D893-F48B10AA472E}"/>
+          </ac:cxnSpMkLst>
+        </pc:cxnChg>
+        <pc:cxnChg chg="add mod">
+          <ac:chgData name="Justin Jones" userId="S::justin.jones@cnpcusa.com::d548d167-3381-4d70-866b-4efa696e272f" providerId="AD" clId="Web-{36EA0625-1292-9CC0-9771-6523B053E64A}" dt="2024-07-17T18:20:10.619" v="314" actId="14100"/>
+          <ac:cxnSpMkLst>
+            <pc:docMk/>
+            <pc:sldMk cId="2890609912" sldId="268"/>
+            <ac:cxnSpMk id="13" creationId="{C8106749-77A0-73F2-5F49-ADD2085744A3}"/>
+          </ac:cxnSpMkLst>
+        </pc:cxnChg>
+        <pc:cxnChg chg="add mod">
+          <ac:chgData name="Justin Jones" userId="S::justin.jones@cnpcusa.com::d548d167-3381-4d70-866b-4efa696e272f" providerId="AD" clId="Web-{36EA0625-1292-9CC0-9771-6523B053E64A}" dt="2024-07-17T18:20:02.150" v="313" actId="14100"/>
+          <ac:cxnSpMkLst>
+            <pc:docMk/>
+            <pc:sldMk cId="2890609912" sldId="268"/>
+            <ac:cxnSpMk id="14" creationId="{ABC1C16D-398B-0DBF-E11B-1B929020E54B}"/>
+          </ac:cxnSpMkLst>
+        </pc:cxnChg>
+      </pc:sldChg>
+      <pc:sldChg chg="addSp delSp modSp">
+        <pc:chgData name="Justin Jones" userId="S::justin.jones@cnpcusa.com::d548d167-3381-4d70-866b-4efa696e272f" providerId="AD" clId="Web-{36EA0625-1292-9CC0-9771-6523B053E64A}" dt="2024-07-17T18:23:47.956" v="327"/>
+        <pc:sldMkLst>
+          <pc:docMk/>
+          <pc:sldMk cId="341063258" sldId="269"/>
+        </pc:sldMkLst>
+        <pc:spChg chg="mod">
+          <ac:chgData name="Justin Jones" userId="S::justin.jones@cnpcusa.com::d548d167-3381-4d70-866b-4efa696e272f" providerId="AD" clId="Web-{36EA0625-1292-9CC0-9771-6523B053E64A}" dt="2024-07-17T18:05:14.689" v="180" actId="20577"/>
+          <ac:spMkLst>
+            <pc:docMk/>
+            <pc:sldMk cId="341063258" sldId="269"/>
+            <ac:spMk id="3" creationId="{5BFDA1E2-DACB-B107-DE39-D2A1201C9AA5}"/>
+          </ac:spMkLst>
+        </pc:spChg>
+        <pc:spChg chg="del">
+          <ac:chgData name="Justin Jones" userId="S::justin.jones@cnpcusa.com::d548d167-3381-4d70-866b-4efa696e272f" providerId="AD" clId="Web-{36EA0625-1292-9CC0-9771-6523B053E64A}" dt="2024-07-17T17:56:25.524" v="54"/>
+          <ac:spMkLst>
+            <pc:docMk/>
+            <pc:sldMk cId="341063258" sldId="269"/>
+            <ac:spMk id="5" creationId="{BECC5715-81E0-AD2F-9298-7F3DB4ED3E3B}"/>
+          </ac:spMkLst>
+        </pc:spChg>
+        <pc:spChg chg="add mod">
+          <ac:chgData name="Justin Jones" userId="S::justin.jones@cnpcusa.com::d548d167-3381-4d70-866b-4efa696e272f" providerId="AD" clId="Web-{36EA0625-1292-9CC0-9771-6523B053E64A}" dt="2024-07-17T18:23:47.956" v="327"/>
+          <ac:spMkLst>
+            <pc:docMk/>
+            <pc:sldMk cId="341063258" sldId="269"/>
+            <ac:spMk id="7" creationId="{F562B2FF-251E-3F9C-B488-00DF4E91077D}"/>
+          </ac:spMkLst>
+        </pc:spChg>
+        <pc:spChg chg="del">
+          <ac:chgData name="Justin Jones" userId="S::justin.jones@cnpcusa.com::d548d167-3381-4d70-866b-4efa696e272f" providerId="AD" clId="Web-{36EA0625-1292-9CC0-9771-6523B053E64A}" dt="2024-07-17T17:56:21.367" v="53"/>
+          <ac:spMkLst>
+            <pc:docMk/>
+            <pc:sldMk cId="341063258" sldId="269"/>
+            <ac:spMk id="10" creationId="{4D970A9A-4EB7-89C3-45BF-1B9A9A3EACF0}"/>
+          </ac:spMkLst>
+        </pc:spChg>
+        <pc:picChg chg="del">
+          <ac:chgData name="Justin Jones" userId="S::justin.jones@cnpcusa.com::d548d167-3381-4d70-866b-4efa696e272f" providerId="AD" clId="Web-{36EA0625-1292-9CC0-9771-6523B053E64A}" dt="2024-07-17T17:56:14.289" v="49"/>
+          <ac:picMkLst>
+            <pc:docMk/>
+            <pc:sldMk cId="341063258" sldId="269"/>
+            <ac:picMk id="4" creationId="{02C6D318-A858-580D-2E63-7BF688FFBB06}"/>
+          </ac:picMkLst>
+        </pc:picChg>
+        <pc:picChg chg="add mod">
+          <ac:chgData name="Justin Jones" userId="S::justin.jones@cnpcusa.com::d548d167-3381-4d70-866b-4efa696e272f" providerId="AD" clId="Web-{36EA0625-1292-9CC0-9771-6523B053E64A}" dt="2024-07-17T17:56:31.539" v="56" actId="1076"/>
+          <ac:picMkLst>
+            <pc:docMk/>
+            <pc:sldMk cId="341063258" sldId="269"/>
+            <ac:picMk id="6" creationId="{E8BD80BA-AE87-D57E-6644-44EE8A6FBB63}"/>
+          </ac:picMkLst>
+        </pc:picChg>
+        <pc:picChg chg="del">
+          <ac:chgData name="Justin Jones" userId="S::justin.jones@cnpcusa.com::d548d167-3381-4d70-866b-4efa696e272f" providerId="AD" clId="Web-{36EA0625-1292-9CC0-9771-6523B053E64A}" dt="2024-07-17T17:56:13.961" v="48"/>
+          <ac:picMkLst>
+            <pc:docMk/>
+            <pc:sldMk cId="341063258" sldId="269"/>
+            <ac:picMk id="9" creationId="{2CB07DCF-44A7-76DD-DFC5-7BA50974330F}"/>
+          </ac:picMkLst>
+        </pc:picChg>
       </pc:sldChg>
     </pc:docChg>
   </pc:docChgLst>
@@ -415,7 +890,7 @@
           <a:p>
             <a:fld id="{846CE7D5-CF57-46EF-B807-FDD0502418D4}" type="datetimeFigureOut">
               <a:rPr lang="en-US" smtClean="0"/>
-              <a:t>6/26/2024</a:t>
+              <a:t>7/17/2024</a:t>
             </a:fld>
             <a:endParaRPr lang="en-US"/>
           </a:p>
@@ -585,7 +1060,7 @@
           <a:p>
             <a:fld id="{846CE7D5-CF57-46EF-B807-FDD0502418D4}" type="datetimeFigureOut">
               <a:rPr lang="en-US" smtClean="0"/>
-              <a:t>6/26/2024</a:t>
+              <a:t>7/17/2024</a:t>
             </a:fld>
             <a:endParaRPr lang="en-US"/>
           </a:p>
@@ -765,7 +1240,7 @@
           <a:p>
             <a:fld id="{846CE7D5-CF57-46EF-B807-FDD0502418D4}" type="datetimeFigureOut">
               <a:rPr lang="en-US" smtClean="0"/>
-              <a:t>6/26/2024</a:t>
+              <a:t>7/17/2024</a:t>
             </a:fld>
             <a:endParaRPr lang="en-US"/>
           </a:p>
@@ -935,7 +1410,7 @@
           <a:p>
             <a:fld id="{846CE7D5-CF57-46EF-B807-FDD0502418D4}" type="datetimeFigureOut">
               <a:rPr lang="en-US" smtClean="0"/>
-              <a:t>6/26/2024</a:t>
+              <a:t>7/17/2024</a:t>
             </a:fld>
             <a:endParaRPr lang="en-US"/>
           </a:p>
@@ -1181,7 +1656,7 @@
           <a:p>
             <a:fld id="{846CE7D5-CF57-46EF-B807-FDD0502418D4}" type="datetimeFigureOut">
               <a:rPr lang="en-US" smtClean="0"/>
-              <a:t>6/26/2024</a:t>
+              <a:t>7/17/2024</a:t>
             </a:fld>
             <a:endParaRPr lang="en-US"/>
           </a:p>
@@ -1413,7 +1888,7 @@
           <a:p>
             <a:fld id="{846CE7D5-CF57-46EF-B807-FDD0502418D4}" type="datetimeFigureOut">
               <a:rPr lang="en-US" smtClean="0"/>
-              <a:t>6/26/2024</a:t>
+              <a:t>7/17/2024</a:t>
             </a:fld>
             <a:endParaRPr lang="en-US"/>
           </a:p>
@@ -1780,7 +2255,7 @@
           <a:p>
             <a:fld id="{846CE7D5-CF57-46EF-B807-FDD0502418D4}" type="datetimeFigureOut">
               <a:rPr lang="en-US" smtClean="0"/>
-              <a:t>6/26/2024</a:t>
+              <a:t>7/17/2024</a:t>
             </a:fld>
             <a:endParaRPr lang="en-US"/>
           </a:p>
@@ -1898,7 +2373,7 @@
           <a:p>
             <a:fld id="{846CE7D5-CF57-46EF-B807-FDD0502418D4}" type="datetimeFigureOut">
               <a:rPr lang="en-US" smtClean="0"/>
-              <a:t>6/26/2024</a:t>
+              <a:t>7/17/2024</a:t>
             </a:fld>
             <a:endParaRPr lang="en-US"/>
           </a:p>
@@ -1993,7 +2468,7 @@
           <a:p>
             <a:fld id="{846CE7D5-CF57-46EF-B807-FDD0502418D4}" type="datetimeFigureOut">
               <a:rPr lang="en-US" smtClean="0"/>
-              <a:t>6/26/2024</a:t>
+              <a:t>7/17/2024</a:t>
             </a:fld>
             <a:endParaRPr lang="en-US"/>
           </a:p>
@@ -2270,7 +2745,7 @@
           <a:p>
             <a:fld id="{846CE7D5-CF57-46EF-B807-FDD0502418D4}" type="datetimeFigureOut">
               <a:rPr lang="en-US" smtClean="0"/>
-              <a:t>6/26/2024</a:t>
+              <a:t>7/17/2024</a:t>
             </a:fld>
             <a:endParaRPr lang="en-US"/>
           </a:p>
@@ -2527,7 +3002,7 @@
           <a:p>
             <a:fld id="{846CE7D5-CF57-46EF-B807-FDD0502418D4}" type="datetimeFigureOut">
               <a:rPr lang="en-US" smtClean="0"/>
-              <a:t>6/26/2024</a:t>
+              <a:t>7/17/2024</a:t>
             </a:fld>
             <a:endParaRPr lang="en-US"/>
           </a:p>
@@ -2740,7 +3215,7 @@
           <a:p>
             <a:fld id="{846CE7D5-CF57-46EF-B807-FDD0502418D4}" type="datetimeFigureOut">
               <a:rPr lang="en-US" smtClean="0"/>
-              <a:t>6/26/2024</a:t>
+              <a:t>7/17/2024</a:t>
             </a:fld>
             <a:endParaRPr lang="en-US"/>
           </a:p>
@@ -3199,6 +3674,918 @@
 </p:sld>
 </file>
 
+<file path=ppt/slides/slide10.xml><?xml version="1.0" encoding="utf-8"?>
+<p:sld xmlns:a="http://schemas.openxmlformats.org/drawingml/2006/main" xmlns:r="http://schemas.openxmlformats.org/officeDocument/2006/relationships" xmlns:p="http://schemas.openxmlformats.org/presentationml/2006/main">
+  <p:cSld>
+    <p:spTree>
+      <p:nvGrpSpPr>
+        <p:cNvPr id="1" name=""/>
+        <p:cNvGrpSpPr/>
+        <p:nvPr/>
+      </p:nvGrpSpPr>
+      <p:grpSpPr>
+        <a:xfrm>
+          <a:off x="0" y="0"/>
+          <a:ext cx="0" cy="0"/>
+          <a:chOff x="0" y="0"/>
+          <a:chExt cx="0" cy="0"/>
+        </a:xfrm>
+      </p:grpSpPr>
+      <p:sp>
+        <p:nvSpPr>
+          <p:cNvPr id="2" name="Title 1">
+            <a:extLst>
+              <a:ext uri="{FF2B5EF4-FFF2-40B4-BE49-F238E27FC236}">
+                <a16:creationId xmlns:a16="http://schemas.microsoft.com/office/drawing/2014/main" id="{1F6332E9-69BB-1518-20B0-503139146C67}"/>
+              </a:ext>
+            </a:extLst>
+          </p:cNvPr>
+          <p:cNvSpPr>
+            <a:spLocks noGrp="1"/>
+          </p:cNvSpPr>
+          <p:nvPr>
+            <p:ph type="title"/>
+          </p:nvPr>
+        </p:nvSpPr>
+        <p:spPr/>
+        <p:txBody>
+          <a:bodyPr>
+            <a:normAutofit/>
+          </a:bodyPr>
+          <a:lstStyle/>
+          <a:p>
+            <a:r>
+              <a:rPr lang="en-US" sz="3600" dirty="0"/>
+              <a:t>Bit Tagging</a:t>
+            </a:r>
+          </a:p>
+        </p:txBody>
+      </p:sp>
+      <p:sp>
+        <p:nvSpPr>
+          <p:cNvPr id="3" name="Content Placeholder 2">
+            <a:extLst>
+              <a:ext uri="{FF2B5EF4-FFF2-40B4-BE49-F238E27FC236}">
+                <a16:creationId xmlns:a16="http://schemas.microsoft.com/office/drawing/2014/main" id="{5BFDA1E2-DACB-B107-DE39-D2A1201C9AA5}"/>
+              </a:ext>
+            </a:extLst>
+          </p:cNvPr>
+          <p:cNvSpPr>
+            <a:spLocks noGrp="1"/>
+          </p:cNvSpPr>
+          <p:nvPr>
+            <p:ph idx="1"/>
+          </p:nvPr>
+        </p:nvSpPr>
+        <p:spPr/>
+        <p:txBody>
+          <a:bodyPr vert="horz" lIns="91440" tIns="45720" rIns="91440" bIns="45720" rtlCol="0" anchor="t">
+            <a:normAutofit/>
+          </a:bodyPr>
+          <a:lstStyle/>
+          <a:p>
+            <a:pPr marL="342900" indent="-342900">
+              <a:buAutoNum type="arabicPeriod"/>
+            </a:pPr>
+            <a:r>
+              <a:rPr lang="en-US" sz="1600" dirty="0">
+                <a:ea typeface="+mn-lt"/>
+                <a:cs typeface="+mn-lt"/>
+              </a:rPr>
+              <a:t>Tag gauge pad surface only (highlighted green in image)</a:t>
+            </a:r>
+            <a:endParaRPr lang="en-US" dirty="0"/>
+          </a:p>
+          <a:p>
+            <a:pPr marL="342900" indent="-342900">
+              <a:buAutoNum type="arabicPeriod"/>
+            </a:pPr>
+            <a:r>
+              <a:rPr lang="en-US" sz="1600" dirty="0">
+                <a:ea typeface="+mn-lt"/>
+                <a:cs typeface="+mn-lt"/>
+              </a:rPr>
+              <a:t>Be sure to separate pads if grouped to ensure pads are assigned unique names</a:t>
+            </a:r>
+            <a:endParaRPr lang="en-US" dirty="0">
+              <a:ea typeface="+mn-lt"/>
+              <a:cs typeface="+mn-lt"/>
+            </a:endParaRPr>
+          </a:p>
+          <a:p>
+            <a:pPr marL="800100" lvl="1">
+              <a:buFont typeface="Courier New" panose="020B0604020202020204" pitchFamily="34" charset="0"/>
+              <a:buChar char="o"/>
+            </a:pPr>
+            <a:r>
+              <a:rPr lang="en-US" sz="1200" dirty="0">
+                <a:ea typeface="+mn-lt"/>
+                <a:cs typeface="+mn-lt"/>
+              </a:rPr>
+              <a:t>Open gauge pad surface group</a:t>
+            </a:r>
+          </a:p>
+          <a:p>
+            <a:pPr marL="800100" lvl="1">
+              <a:buFont typeface="Courier New" panose="020B0604020202020204" pitchFamily="34" charset="0"/>
+              <a:buChar char="o"/>
+            </a:pPr>
+            <a:r>
+              <a:rPr lang="en-US" sz="1200" dirty="0">
+                <a:ea typeface="+mn-lt"/>
+                <a:cs typeface="+mn-lt"/>
+              </a:rPr>
+              <a:t>Copy-paste (</a:t>
+            </a:r>
+            <a:r>
+              <a:rPr lang="en-US" sz="1200" err="1">
+                <a:ea typeface="+mn-lt"/>
+                <a:cs typeface="+mn-lt"/>
+              </a:rPr>
+              <a:t>ctrl+c</a:t>
+            </a:r>
+            <a:r>
+              <a:rPr lang="en-US" sz="1200" dirty="0">
+                <a:ea typeface="+mn-lt"/>
+                <a:cs typeface="+mn-lt"/>
+              </a:rPr>
+              <a:t>, </a:t>
+            </a:r>
+            <a:r>
+              <a:rPr lang="en-US" sz="1200" err="1">
+                <a:ea typeface="+mn-lt"/>
+                <a:cs typeface="+mn-lt"/>
+              </a:rPr>
+              <a:t>ctrl+v</a:t>
+            </a:r>
+            <a:r>
+              <a:rPr lang="en-US" sz="1200" dirty="0">
+                <a:ea typeface="+mn-lt"/>
+                <a:cs typeface="+mn-lt"/>
+              </a:rPr>
+              <a:t>) surface group</a:t>
+            </a:r>
+            <a:endParaRPr lang="en-US" dirty="0">
+              <a:ea typeface="+mn-lt"/>
+              <a:cs typeface="+mn-lt"/>
+            </a:endParaRPr>
+          </a:p>
+          <a:p>
+            <a:pPr marL="800100" lvl="1">
+              <a:buFont typeface="Courier New" panose="020B0604020202020204" pitchFamily="34" charset="0"/>
+              <a:buChar char="o"/>
+            </a:pPr>
+            <a:r>
+              <a:rPr lang="en-US" sz="1200" dirty="0">
+                <a:ea typeface="+mn-lt"/>
+                <a:cs typeface="+mn-lt"/>
+              </a:rPr>
+              <a:t>Options &gt; "Exclude surfaces and Fill  holes"</a:t>
+            </a:r>
+          </a:p>
+          <a:p>
+            <a:pPr marL="800100" lvl="1">
+              <a:buFont typeface="Courier New" panose="020B0604020202020204" pitchFamily="34" charset="0"/>
+              <a:buChar char="o"/>
+            </a:pPr>
+            <a:r>
+              <a:rPr lang="en-US" sz="1200" dirty="0">
+                <a:ea typeface="+mn-lt"/>
+                <a:cs typeface="+mn-lt"/>
+              </a:rPr>
+              <a:t>Using </a:t>
+            </a:r>
+            <a:r>
+              <a:rPr lang="en-US" sz="1200" dirty="0" err="1">
+                <a:ea typeface="+mn-lt"/>
+                <a:cs typeface="+mn-lt"/>
+              </a:rPr>
+              <a:t>Ctrl+left</a:t>
+            </a:r>
+            <a:r>
+              <a:rPr lang="en-US" sz="1200" dirty="0">
+                <a:ea typeface="+mn-lt"/>
+                <a:cs typeface="+mn-lt"/>
+              </a:rPr>
+              <a:t> click select surfaces elements to be deleted</a:t>
+            </a:r>
+          </a:p>
+          <a:p>
+            <a:pPr marL="800100" lvl="1">
+              <a:buFont typeface="Courier New" panose="020B0604020202020204" pitchFamily="34" charset="0"/>
+              <a:buChar char="o"/>
+            </a:pPr>
+            <a:r>
+              <a:rPr lang="en-US" sz="1200" dirty="0">
+                <a:ea typeface="+mn-lt"/>
+                <a:cs typeface="+mn-lt"/>
+              </a:rPr>
+              <a:t>Repeat until each pad is its own unique surface group</a:t>
+            </a:r>
+          </a:p>
+          <a:p>
+            <a:pPr>
+              <a:buAutoNum type="arabicPeriod"/>
+            </a:pPr>
+            <a:endParaRPr lang="en-US" sz="1600" dirty="0"/>
+          </a:p>
+        </p:txBody>
+      </p:sp>
+      <p:pic>
+        <p:nvPicPr>
+          <p:cNvPr id="6" name="Picture 5" descr="A red and yellow object with holes&#10;&#10;Description automatically generated">
+            <a:extLst>
+              <a:ext uri="{FF2B5EF4-FFF2-40B4-BE49-F238E27FC236}">
+                <a16:creationId xmlns:a16="http://schemas.microsoft.com/office/drawing/2014/main" id="{E8BD80BA-AE87-D57E-6644-44EE8A6FBB63}"/>
+              </a:ext>
+            </a:extLst>
+          </p:cNvPr>
+          <p:cNvPicPr>
+            <a:picLocks noChangeAspect="1"/>
+          </p:cNvPicPr>
+          <p:nvPr/>
+        </p:nvPicPr>
+        <p:blipFill>
+          <a:blip r:embed="rId2"/>
+          <a:stretch>
+            <a:fillRect/>
+          </a:stretch>
+        </p:blipFill>
+        <p:spPr>
+          <a:xfrm>
+            <a:off x="6908791" y="2800350"/>
+            <a:ext cx="5032393" cy="3790950"/>
+          </a:xfrm>
+          <a:prstGeom prst="rect">
+            <a:avLst/>
+          </a:prstGeom>
+        </p:spPr>
+      </p:pic>
+      <p:sp>
+        <p:nvSpPr>
+          <p:cNvPr id="7" name="Oval 6">
+            <a:extLst>
+              <a:ext uri="{FF2B5EF4-FFF2-40B4-BE49-F238E27FC236}">
+                <a16:creationId xmlns:a16="http://schemas.microsoft.com/office/drawing/2014/main" id="{F562B2FF-251E-3F9C-B488-00DF4E91077D}"/>
+              </a:ext>
+            </a:extLst>
+          </p:cNvPr>
+          <p:cNvSpPr/>
+          <p:nvPr/>
+        </p:nvSpPr>
+        <p:spPr>
+          <a:xfrm rot="480000">
+            <a:off x="8245817" y="3296386"/>
+            <a:ext cx="1409700" cy="2133600"/>
+          </a:xfrm>
+          <a:prstGeom prst="ellipse">
+            <a:avLst/>
+          </a:prstGeom>
+          <a:noFill/>
+          <a:ln w="57150">
+            <a:solidFill>
+              <a:srgbClr val="00B0F0"/>
+            </a:solidFill>
+          </a:ln>
+        </p:spPr>
+        <p:style>
+          <a:lnRef idx="2">
+            <a:schemeClr val="accent1"/>
+          </a:lnRef>
+          <a:fillRef idx="1">
+            <a:schemeClr val="lt1"/>
+          </a:fillRef>
+          <a:effectRef idx="0">
+            <a:schemeClr val="accent1"/>
+          </a:effectRef>
+          <a:fontRef idx="minor">
+            <a:schemeClr val="dk1"/>
+          </a:fontRef>
+        </p:style>
+        <p:txBody>
+          <a:bodyPr rtlCol="0" anchor="ctr"/>
+          <a:lstStyle/>
+          <a:p>
+            <a:pPr algn="ctr"/>
+            <a:endParaRPr lang="en-US"/>
+          </a:p>
+        </p:txBody>
+      </p:sp>
+    </p:spTree>
+    <p:extLst>
+      <p:ext uri="{BB962C8B-B14F-4D97-AF65-F5344CB8AC3E}">
+        <p14:creationId xmlns:p14="http://schemas.microsoft.com/office/powerpoint/2010/main" val="341063258"/>
+      </p:ext>
+    </p:extLst>
+  </p:cSld>
+  <p:clrMapOvr>
+    <a:masterClrMapping/>
+  </p:clrMapOvr>
+</p:sld>
+</file>
+
+<file path=ppt/slides/slide11.xml><?xml version="1.0" encoding="utf-8"?>
+<p:sld xmlns:a="http://schemas.openxmlformats.org/drawingml/2006/main" xmlns:r="http://schemas.openxmlformats.org/officeDocument/2006/relationships" xmlns:p="http://schemas.openxmlformats.org/presentationml/2006/main">
+  <p:cSld>
+    <p:spTree>
+      <p:nvGrpSpPr>
+        <p:cNvPr id="1" name=""/>
+        <p:cNvGrpSpPr/>
+        <p:nvPr/>
+      </p:nvGrpSpPr>
+      <p:grpSpPr>
+        <a:xfrm>
+          <a:off x="0" y="0"/>
+          <a:ext cx="0" cy="0"/>
+          <a:chOff x="0" y="0"/>
+          <a:chExt cx="0" cy="0"/>
+        </a:xfrm>
+      </p:grpSpPr>
+      <p:pic>
+        <p:nvPicPr>
+          <p:cNvPr id="5" name="Picture 4">
+            <a:extLst>
+              <a:ext uri="{FF2B5EF4-FFF2-40B4-BE49-F238E27FC236}">
+                <a16:creationId xmlns:a16="http://schemas.microsoft.com/office/drawing/2014/main" id="{09164FC3-2305-B7E8-9DAD-555E492634F0}"/>
+              </a:ext>
+            </a:extLst>
+          </p:cNvPr>
+          <p:cNvPicPr>
+            <a:picLocks noChangeAspect="1"/>
+          </p:cNvPicPr>
+          <p:nvPr/>
+        </p:nvPicPr>
+        <p:blipFill>
+          <a:blip r:embed="rId2"/>
+          <a:stretch>
+            <a:fillRect/>
+          </a:stretch>
+        </p:blipFill>
+        <p:spPr>
+          <a:xfrm>
+            <a:off x="5457825" y="752475"/>
+            <a:ext cx="6496050" cy="5810250"/>
+          </a:xfrm>
+          <a:prstGeom prst="rect">
+            <a:avLst/>
+          </a:prstGeom>
+        </p:spPr>
+      </p:pic>
+      <p:sp>
+        <p:nvSpPr>
+          <p:cNvPr id="2" name="Title 1">
+            <a:extLst>
+              <a:ext uri="{FF2B5EF4-FFF2-40B4-BE49-F238E27FC236}">
+                <a16:creationId xmlns:a16="http://schemas.microsoft.com/office/drawing/2014/main" id="{1F6332E9-69BB-1518-20B0-503139146C67}"/>
+              </a:ext>
+            </a:extLst>
+          </p:cNvPr>
+          <p:cNvSpPr>
+            <a:spLocks noGrp="1"/>
+          </p:cNvSpPr>
+          <p:nvPr>
+            <p:ph type="title"/>
+          </p:nvPr>
+        </p:nvSpPr>
+        <p:spPr>
+          <a:xfrm>
+            <a:off x="838200" y="365125"/>
+            <a:ext cx="6143625" cy="1335088"/>
+          </a:xfrm>
+        </p:spPr>
+        <p:txBody>
+          <a:bodyPr>
+            <a:normAutofit/>
+          </a:bodyPr>
+          <a:lstStyle/>
+          <a:p>
+            <a:r>
+              <a:rPr lang="en-US" sz="3600" dirty="0"/>
+              <a:t>Cutter Tagging</a:t>
+            </a:r>
+            <a:endParaRPr lang="en-US" dirty="0"/>
+          </a:p>
+        </p:txBody>
+      </p:sp>
+      <p:sp>
+        <p:nvSpPr>
+          <p:cNvPr id="3" name="Content Placeholder 2">
+            <a:extLst>
+              <a:ext uri="{FF2B5EF4-FFF2-40B4-BE49-F238E27FC236}">
+                <a16:creationId xmlns:a16="http://schemas.microsoft.com/office/drawing/2014/main" id="{5BFDA1E2-DACB-B107-DE39-D2A1201C9AA5}"/>
+              </a:ext>
+            </a:extLst>
+          </p:cNvPr>
+          <p:cNvSpPr>
+            <a:spLocks noGrp="1"/>
+          </p:cNvSpPr>
+          <p:nvPr>
+            <p:ph idx="1"/>
+          </p:nvPr>
+        </p:nvSpPr>
+        <p:spPr>
+          <a:xfrm>
+            <a:off x="838200" y="1722709"/>
+            <a:ext cx="4371975" cy="4379913"/>
+          </a:xfrm>
+        </p:spPr>
+        <p:txBody>
+          <a:bodyPr vert="horz" lIns="91440" tIns="45720" rIns="91440" bIns="45720" rtlCol="0" anchor="t">
+            <a:normAutofit/>
+          </a:bodyPr>
+          <a:lstStyle/>
+          <a:p>
+            <a:pPr marL="342900" indent="-342900">
+              <a:buAutoNum type="arabicPeriod"/>
+            </a:pPr>
+            <a:r>
+              <a:rPr lang="en-US" sz="1600" dirty="0">
+                <a:ea typeface="+mn-lt"/>
+                <a:cs typeface="+mn-lt"/>
+              </a:rPr>
+              <a:t>Tag cutter elements as shown in image</a:t>
+            </a:r>
+            <a:endParaRPr lang="en-US" sz="1600" dirty="0"/>
+          </a:p>
+        </p:txBody>
+      </p:sp>
+      <p:sp>
+        <p:nvSpPr>
+          <p:cNvPr id="6" name="TextBox 5">
+            <a:extLst>
+              <a:ext uri="{FF2B5EF4-FFF2-40B4-BE49-F238E27FC236}">
+                <a16:creationId xmlns:a16="http://schemas.microsoft.com/office/drawing/2014/main" id="{53950D08-E593-8FD4-F2BF-88D830465ACD}"/>
+              </a:ext>
+            </a:extLst>
+          </p:cNvPr>
+          <p:cNvSpPr txBox="1"/>
+          <p:nvPr/>
+        </p:nvSpPr>
+        <p:spPr>
+          <a:xfrm>
+            <a:off x="4519642" y="3606901"/>
+            <a:ext cx="1882357" cy="646331"/>
+          </a:xfrm>
+          <a:prstGeom prst="rect">
+            <a:avLst/>
+          </a:prstGeom>
+          <a:noFill/>
+        </p:spPr>
+        <p:txBody>
+          <a:bodyPr rot="0" spcFirstLastPara="0" vertOverflow="overflow" horzOverflow="overflow" vert="horz" wrap="square" lIns="91440" tIns="45720" rIns="91440" bIns="45720" numCol="1" spcCol="0" rtlCol="0" fromWordArt="0" anchor="t" anchorCtr="0" forceAA="0" compatLnSpc="1">
+            <a:prstTxWarp prst="textNoShape">
+              <a:avLst/>
+            </a:prstTxWarp>
+            <a:spAutoFit/>
+          </a:bodyPr>
+          <a:lstStyle/>
+          <a:p>
+            <a:r>
+              <a:rPr lang="en-US" dirty="0">
+                <a:solidFill>
+                  <a:srgbClr val="C00000"/>
+                </a:solidFill>
+              </a:rPr>
+              <a:t>Cutter chamfer (surface edge)</a:t>
+            </a:r>
+          </a:p>
+        </p:txBody>
+      </p:sp>
+      <p:cxnSp>
+        <p:nvCxnSpPr>
+          <p:cNvPr id="7" name="Straight Arrow Connector 6">
+            <a:extLst>
+              <a:ext uri="{FF2B5EF4-FFF2-40B4-BE49-F238E27FC236}">
+                <a16:creationId xmlns:a16="http://schemas.microsoft.com/office/drawing/2014/main" id="{7B93B970-EE7E-B1D4-5F0B-5A6B567FBB67}"/>
+              </a:ext>
+            </a:extLst>
+          </p:cNvPr>
+          <p:cNvCxnSpPr/>
+          <p:nvPr/>
+        </p:nvCxnSpPr>
+        <p:spPr>
+          <a:xfrm>
+            <a:off x="6105525" y="3981450"/>
+            <a:ext cx="1743075" cy="1095375"/>
+          </a:xfrm>
+          <a:prstGeom prst="straightConnector1">
+            <a:avLst/>
+          </a:prstGeom>
+          <a:ln>
+            <a:solidFill>
+              <a:srgbClr val="C00000"/>
+            </a:solidFill>
+            <a:tailEnd type="triangle"/>
+          </a:ln>
+        </p:spPr>
+        <p:style>
+          <a:lnRef idx="2">
+            <a:schemeClr val="accent1"/>
+          </a:lnRef>
+          <a:fillRef idx="0">
+            <a:schemeClr val="accent1"/>
+          </a:fillRef>
+          <a:effectRef idx="1">
+            <a:schemeClr val="accent1"/>
+          </a:effectRef>
+          <a:fontRef idx="minor">
+            <a:schemeClr val="tx1"/>
+          </a:fontRef>
+        </p:style>
+      </p:cxnSp>
+      <p:cxnSp>
+        <p:nvCxnSpPr>
+          <p:cNvPr id="8" name="Straight Arrow Connector 7">
+            <a:extLst>
+              <a:ext uri="{FF2B5EF4-FFF2-40B4-BE49-F238E27FC236}">
+                <a16:creationId xmlns:a16="http://schemas.microsoft.com/office/drawing/2014/main" id="{78AEA6CA-9F4B-D46A-1E56-AE257FD8EE16}"/>
+              </a:ext>
+            </a:extLst>
+          </p:cNvPr>
+          <p:cNvCxnSpPr>
+            <a:cxnSpLocks/>
+          </p:cNvCxnSpPr>
+          <p:nvPr/>
+        </p:nvCxnSpPr>
+        <p:spPr>
+          <a:xfrm flipV="1">
+            <a:off x="6105525" y="3400424"/>
+            <a:ext cx="2019300" cy="581025"/>
+          </a:xfrm>
+          <a:prstGeom prst="straightConnector1">
+            <a:avLst/>
+          </a:prstGeom>
+          <a:ln>
+            <a:solidFill>
+              <a:srgbClr val="C00000"/>
+            </a:solidFill>
+            <a:tailEnd type="triangle"/>
+          </a:ln>
+        </p:spPr>
+        <p:style>
+          <a:lnRef idx="2">
+            <a:schemeClr val="accent1"/>
+          </a:lnRef>
+          <a:fillRef idx="0">
+            <a:schemeClr val="accent1"/>
+          </a:fillRef>
+          <a:effectRef idx="1">
+            <a:schemeClr val="accent1"/>
+          </a:effectRef>
+          <a:fontRef idx="minor">
+            <a:schemeClr val="tx1"/>
+          </a:fontRef>
+        </p:style>
+      </p:cxnSp>
+      <p:sp>
+        <p:nvSpPr>
+          <p:cNvPr id="9" name="TextBox 8">
+            <a:extLst>
+              <a:ext uri="{FF2B5EF4-FFF2-40B4-BE49-F238E27FC236}">
+                <a16:creationId xmlns:a16="http://schemas.microsoft.com/office/drawing/2014/main" id="{B0C424A9-03CC-EB29-011B-F2A0CCBFFD7D}"/>
+              </a:ext>
+            </a:extLst>
+          </p:cNvPr>
+          <p:cNvSpPr txBox="1"/>
+          <p:nvPr/>
+        </p:nvSpPr>
+        <p:spPr>
+          <a:xfrm>
+            <a:off x="10453717" y="6102450"/>
+            <a:ext cx="1387057" cy="369332"/>
+          </a:xfrm>
+          <a:prstGeom prst="rect">
+            <a:avLst/>
+          </a:prstGeom>
+          <a:noFill/>
+        </p:spPr>
+        <p:txBody>
+          <a:bodyPr rot="0" spcFirstLastPara="0" vertOverflow="overflow" horzOverflow="overflow" vert="horz" wrap="square" lIns="91440" tIns="45720" rIns="91440" bIns="45720" numCol="1" spcCol="0" rtlCol="0" fromWordArt="0" anchor="t" anchorCtr="0" forceAA="0" compatLnSpc="1">
+            <a:prstTxWarp prst="textNoShape">
+              <a:avLst/>
+            </a:prstTxWarp>
+            <a:spAutoFit/>
+          </a:bodyPr>
+          <a:lstStyle/>
+          <a:p>
+            <a:r>
+              <a:rPr lang="en-US" dirty="0">
+                <a:solidFill>
+                  <a:srgbClr val="C00000"/>
+                </a:solidFill>
+              </a:rPr>
+              <a:t>Cutter face</a:t>
+            </a:r>
+          </a:p>
+        </p:txBody>
+      </p:sp>
+      <p:cxnSp>
+        <p:nvCxnSpPr>
+          <p:cNvPr id="10" name="Straight Arrow Connector 9">
+            <a:extLst>
+              <a:ext uri="{FF2B5EF4-FFF2-40B4-BE49-F238E27FC236}">
+                <a16:creationId xmlns:a16="http://schemas.microsoft.com/office/drawing/2014/main" id="{B58946CE-D297-A493-FEC2-0D54F76190F6}"/>
+              </a:ext>
+            </a:extLst>
+          </p:cNvPr>
+          <p:cNvCxnSpPr>
+            <a:cxnSpLocks/>
+          </p:cNvCxnSpPr>
+          <p:nvPr/>
+        </p:nvCxnSpPr>
+        <p:spPr>
+          <a:xfrm flipH="1" flipV="1">
+            <a:off x="9601200" y="5286374"/>
+            <a:ext cx="847725" cy="962025"/>
+          </a:xfrm>
+          <a:prstGeom prst="straightConnector1">
+            <a:avLst/>
+          </a:prstGeom>
+          <a:ln>
+            <a:solidFill>
+              <a:srgbClr val="C00000"/>
+            </a:solidFill>
+            <a:tailEnd type="triangle"/>
+          </a:ln>
+        </p:spPr>
+        <p:style>
+          <a:lnRef idx="2">
+            <a:schemeClr val="accent1"/>
+          </a:lnRef>
+          <a:fillRef idx="0">
+            <a:schemeClr val="accent1"/>
+          </a:fillRef>
+          <a:effectRef idx="1">
+            <a:schemeClr val="accent1"/>
+          </a:effectRef>
+          <a:fontRef idx="minor">
+            <a:schemeClr val="tx1"/>
+          </a:fontRef>
+        </p:style>
+      </p:cxnSp>
+      <p:cxnSp>
+        <p:nvCxnSpPr>
+          <p:cNvPr id="11" name="Straight Arrow Connector 10">
+            <a:extLst>
+              <a:ext uri="{FF2B5EF4-FFF2-40B4-BE49-F238E27FC236}">
+                <a16:creationId xmlns:a16="http://schemas.microsoft.com/office/drawing/2014/main" id="{04B17C7D-43F4-29A8-D893-F48B10AA472E}"/>
+              </a:ext>
+            </a:extLst>
+          </p:cNvPr>
+          <p:cNvCxnSpPr>
+            <a:cxnSpLocks/>
+          </p:cNvCxnSpPr>
+          <p:nvPr/>
+        </p:nvCxnSpPr>
+        <p:spPr>
+          <a:xfrm flipH="1" flipV="1">
+            <a:off x="10229850" y="3943349"/>
+            <a:ext cx="200025" cy="2305050"/>
+          </a:xfrm>
+          <a:prstGeom prst="straightConnector1">
+            <a:avLst/>
+          </a:prstGeom>
+          <a:ln>
+            <a:solidFill>
+              <a:srgbClr val="C00000"/>
+            </a:solidFill>
+            <a:tailEnd type="triangle"/>
+          </a:ln>
+        </p:spPr>
+        <p:style>
+          <a:lnRef idx="2">
+            <a:schemeClr val="accent1"/>
+          </a:lnRef>
+          <a:fillRef idx="0">
+            <a:schemeClr val="accent1"/>
+          </a:fillRef>
+          <a:effectRef idx="1">
+            <a:schemeClr val="accent1"/>
+          </a:effectRef>
+          <a:fontRef idx="minor">
+            <a:schemeClr val="tx1"/>
+          </a:fontRef>
+        </p:style>
+      </p:cxnSp>
+      <p:sp>
+        <p:nvSpPr>
+          <p:cNvPr id="12" name="TextBox 11">
+            <a:extLst>
+              <a:ext uri="{FF2B5EF4-FFF2-40B4-BE49-F238E27FC236}">
+                <a16:creationId xmlns:a16="http://schemas.microsoft.com/office/drawing/2014/main" id="{F5B528AF-8B99-293B-67B0-C0568F9BF972}"/>
+              </a:ext>
+            </a:extLst>
+          </p:cNvPr>
+          <p:cNvSpPr txBox="1"/>
+          <p:nvPr/>
+        </p:nvSpPr>
+        <p:spPr>
+          <a:xfrm>
+            <a:off x="9434542" y="568425"/>
+            <a:ext cx="2634832" cy="923330"/>
+          </a:xfrm>
+          <a:prstGeom prst="rect">
+            <a:avLst/>
+          </a:prstGeom>
+          <a:noFill/>
+        </p:spPr>
+        <p:txBody>
+          <a:bodyPr rot="0" spcFirstLastPara="0" vertOverflow="overflow" horzOverflow="overflow" vert="horz" wrap="square" lIns="91440" tIns="45720" rIns="91440" bIns="45720" numCol="1" spcCol="0" rtlCol="0" fromWordArt="0" anchor="t" anchorCtr="0" forceAA="0" compatLnSpc="1">
+            <a:prstTxWarp prst="textNoShape">
+              <a:avLst/>
+            </a:prstTxWarp>
+            <a:spAutoFit/>
+          </a:bodyPr>
+          <a:lstStyle/>
+          <a:p>
+            <a:r>
+              <a:rPr lang="en-US" dirty="0">
+                <a:solidFill>
+                  <a:srgbClr val="C00000"/>
+                </a:solidFill>
+              </a:rPr>
+              <a:t>Cutter body</a:t>
+            </a:r>
+            <a:endParaRPr lang="en-US" dirty="0"/>
+          </a:p>
+          <a:p>
+            <a:r>
+              <a:rPr lang="en-US" dirty="0">
+                <a:solidFill>
+                  <a:srgbClr val="C00000"/>
+                </a:solidFill>
+              </a:rPr>
+              <a:t>(all remaining pieces not chamfer or face)</a:t>
+            </a:r>
+            <a:endParaRPr lang="en-US"/>
+          </a:p>
+        </p:txBody>
+      </p:sp>
+      <p:cxnSp>
+        <p:nvCxnSpPr>
+          <p:cNvPr id="13" name="Straight Arrow Connector 12">
+            <a:extLst>
+              <a:ext uri="{FF2B5EF4-FFF2-40B4-BE49-F238E27FC236}">
+                <a16:creationId xmlns:a16="http://schemas.microsoft.com/office/drawing/2014/main" id="{C8106749-77A0-73F2-5F49-ADD2085744A3}"/>
+              </a:ext>
+            </a:extLst>
+          </p:cNvPr>
+          <p:cNvCxnSpPr>
+            <a:cxnSpLocks/>
+          </p:cNvCxnSpPr>
+          <p:nvPr/>
+        </p:nvCxnSpPr>
+        <p:spPr>
+          <a:xfrm flipH="1">
+            <a:off x="8648700" y="895349"/>
+            <a:ext cx="790575" cy="1133475"/>
+          </a:xfrm>
+          <a:prstGeom prst="straightConnector1">
+            <a:avLst/>
+          </a:prstGeom>
+          <a:ln>
+            <a:solidFill>
+              <a:srgbClr val="C00000"/>
+            </a:solidFill>
+            <a:tailEnd type="triangle"/>
+          </a:ln>
+        </p:spPr>
+        <p:style>
+          <a:lnRef idx="2">
+            <a:schemeClr val="accent1"/>
+          </a:lnRef>
+          <a:fillRef idx="0">
+            <a:schemeClr val="accent1"/>
+          </a:fillRef>
+          <a:effectRef idx="1">
+            <a:schemeClr val="accent1"/>
+          </a:effectRef>
+          <a:fontRef idx="minor">
+            <a:schemeClr val="tx1"/>
+          </a:fontRef>
+        </p:style>
+      </p:cxnSp>
+      <p:cxnSp>
+        <p:nvCxnSpPr>
+          <p:cNvPr id="14" name="Straight Arrow Connector 13">
+            <a:extLst>
+              <a:ext uri="{FF2B5EF4-FFF2-40B4-BE49-F238E27FC236}">
+                <a16:creationId xmlns:a16="http://schemas.microsoft.com/office/drawing/2014/main" id="{ABC1C16D-398B-0DBF-E11B-1B929020E54B}"/>
+              </a:ext>
+            </a:extLst>
+          </p:cNvPr>
+          <p:cNvCxnSpPr>
+            <a:cxnSpLocks/>
+          </p:cNvCxnSpPr>
+          <p:nvPr/>
+        </p:nvCxnSpPr>
+        <p:spPr>
+          <a:xfrm flipH="1">
+            <a:off x="8410575" y="914399"/>
+            <a:ext cx="1019175" cy="628650"/>
+          </a:xfrm>
+          <a:prstGeom prst="straightConnector1">
+            <a:avLst/>
+          </a:prstGeom>
+          <a:ln>
+            <a:solidFill>
+              <a:srgbClr val="C00000"/>
+            </a:solidFill>
+            <a:tailEnd type="triangle"/>
+          </a:ln>
+        </p:spPr>
+        <p:style>
+          <a:lnRef idx="2">
+            <a:schemeClr val="accent1"/>
+          </a:lnRef>
+          <a:fillRef idx="0">
+            <a:schemeClr val="accent1"/>
+          </a:fillRef>
+          <a:effectRef idx="1">
+            <a:schemeClr val="accent1"/>
+          </a:effectRef>
+          <a:fontRef idx="minor">
+            <a:schemeClr val="tx1"/>
+          </a:fontRef>
+        </p:style>
+      </p:cxnSp>
+    </p:spTree>
+    <p:extLst>
+      <p:ext uri="{BB962C8B-B14F-4D97-AF65-F5344CB8AC3E}">
+        <p14:creationId xmlns:p14="http://schemas.microsoft.com/office/powerpoint/2010/main" val="2890609912"/>
+      </p:ext>
+    </p:extLst>
+  </p:cSld>
+  <p:clrMapOvr>
+    <a:masterClrMapping/>
+  </p:clrMapOvr>
+</p:sld>
+</file>
+
+<file path=ppt/slides/slide12.xml><?xml version="1.0" encoding="utf-8"?>
+<p:sld xmlns:a="http://schemas.openxmlformats.org/drawingml/2006/main" xmlns:r="http://schemas.openxmlformats.org/officeDocument/2006/relationships" xmlns:p="http://schemas.openxmlformats.org/presentationml/2006/main">
+  <p:cSld>
+    <p:spTree>
+      <p:nvGrpSpPr>
+        <p:cNvPr id="1" name=""/>
+        <p:cNvGrpSpPr/>
+        <p:nvPr/>
+      </p:nvGrpSpPr>
+      <p:grpSpPr>
+        <a:xfrm>
+          <a:off x="0" y="0"/>
+          <a:ext cx="0" cy="0"/>
+          <a:chOff x="0" y="0"/>
+          <a:chExt cx="0" cy="0"/>
+        </a:xfrm>
+      </p:grpSpPr>
+      <p:sp>
+        <p:nvSpPr>
+          <p:cNvPr id="2" name="Title 1">
+            <a:extLst>
+              <a:ext uri="{FF2B5EF4-FFF2-40B4-BE49-F238E27FC236}">
+                <a16:creationId xmlns:a16="http://schemas.microsoft.com/office/drawing/2014/main" id="{16055984-C5B8-5B84-88F9-FBAD33C2F368}"/>
+              </a:ext>
+            </a:extLst>
+          </p:cNvPr>
+          <p:cNvSpPr>
+            <a:spLocks noGrp="1"/>
+          </p:cNvSpPr>
+          <p:nvPr>
+            <p:ph type="title"/>
+          </p:nvPr>
+        </p:nvSpPr>
+        <p:spPr>
+          <a:xfrm>
+            <a:off x="838200" y="2769366"/>
+            <a:ext cx="10515600" cy="1325563"/>
+          </a:xfrm>
+        </p:spPr>
+        <p:txBody>
+          <a:bodyPr/>
+          <a:lstStyle/>
+          <a:p>
+            <a:pPr algn="ctr"/>
+            <a:r>
+              <a:rPr lang="en-US" dirty="0"/>
+              <a:t>Last Slide</a:t>
+            </a:r>
+          </a:p>
+        </p:txBody>
+      </p:sp>
+    </p:spTree>
+    <p:extLst>
+      <p:ext uri="{BB962C8B-B14F-4D97-AF65-F5344CB8AC3E}">
+        <p14:creationId xmlns:p14="http://schemas.microsoft.com/office/powerpoint/2010/main" val="3614653100"/>
+      </p:ext>
+    </p:extLst>
+  </p:cSld>
+  <p:clrMapOvr>
+    <a:masterClrMapping/>
+  </p:clrMapOvr>
+</p:sld>
+</file>
+
 <file path=ppt/slides/slide2.xml><?xml version="1.0" encoding="utf-8"?>
 <p:sld xmlns:a="http://schemas.openxmlformats.org/drawingml/2006/main" xmlns:r="http://schemas.openxmlformats.org/officeDocument/2006/relationships" xmlns:p="http://schemas.openxmlformats.org/presentationml/2006/main">
   <p:cSld>
@@ -3763,9 +5150,9 @@
                 <a:ea typeface="+mn-lt"/>
                 <a:cs typeface="+mn-lt"/>
               </a:rPr>
-              <a:t>Select Parts (Boxed in red)</a:t>
-            </a:r>
-            <a:endParaRPr lang="en-US"/>
+              <a:t>Select Parts (Boxed in red depending on "Body 1" elements)</a:t>
+            </a:r>
+            <a:endParaRPr lang="en-US" dirty="0"/>
           </a:p>
           <a:p>
             <a:pPr marL="342900" indent="-342900">
@@ -3821,7 +5208,7 @@
         </p:blipFill>
         <p:spPr>
           <a:xfrm>
-            <a:off x="6099717" y="2190750"/>
+            <a:off x="6326258" y="2571750"/>
             <a:ext cx="2743200" cy="4000500"/>
           </a:xfrm>
           <a:prstGeom prst="rect">
@@ -3843,7 +5230,89 @@
         </p:nvSpPr>
         <p:spPr>
           <a:xfrm>
-            <a:off x="6201833" y="3127245"/>
+            <a:off x="6428374" y="3508245"/>
+            <a:ext cx="1849243" cy="743414"/>
+          </a:xfrm>
+          <a:prstGeom prst="rect">
+            <a:avLst/>
+          </a:prstGeom>
+          <a:noFill/>
+          <a:ln w="57150">
+            <a:solidFill>
+              <a:srgbClr val="FF0000"/>
+            </a:solidFill>
+          </a:ln>
+        </p:spPr>
+        <p:style>
+          <a:lnRef idx="2">
+            <a:schemeClr val="accent1">
+              <a:shade val="15000"/>
+            </a:schemeClr>
+          </a:lnRef>
+          <a:fillRef idx="1">
+            <a:schemeClr val="accent1"/>
+          </a:fillRef>
+          <a:effectRef idx="0">
+            <a:schemeClr val="accent1"/>
+          </a:effectRef>
+          <a:fontRef idx="minor">
+            <a:schemeClr val="lt1"/>
+          </a:fontRef>
+        </p:style>
+        <p:txBody>
+          <a:bodyPr rtlCol="0" anchor="ctr"/>
+          <a:lstStyle/>
+          <a:p>
+            <a:pPr algn="ctr"/>
+            <a:endParaRPr lang="en-US"/>
+          </a:p>
+        </p:txBody>
+      </p:sp>
+      <p:pic>
+        <p:nvPicPr>
+          <p:cNvPr id="4" name="Picture 3" descr="A screenshot of a computer&#10;&#10;Description automatically generated">
+            <a:extLst>
+              <a:ext uri="{FF2B5EF4-FFF2-40B4-BE49-F238E27FC236}">
+                <a16:creationId xmlns:a16="http://schemas.microsoft.com/office/drawing/2014/main" id="{02C6D318-A858-580D-2E63-7BF688FFBB06}"/>
+              </a:ext>
+            </a:extLst>
+          </p:cNvPr>
+          <p:cNvPicPr>
+            <a:picLocks noChangeAspect="1"/>
+          </p:cNvPicPr>
+          <p:nvPr/>
+        </p:nvPicPr>
+        <p:blipFill>
+          <a:blip r:embed="rId3"/>
+          <a:stretch>
+            <a:fillRect/>
+          </a:stretch>
+        </p:blipFill>
+        <p:spPr>
+          <a:xfrm>
+            <a:off x="9189566" y="2567889"/>
+            <a:ext cx="2740625" cy="3987628"/>
+          </a:xfrm>
+          <a:prstGeom prst="rect">
+            <a:avLst/>
+          </a:prstGeom>
+        </p:spPr>
+      </p:pic>
+      <p:sp>
+        <p:nvSpPr>
+          <p:cNvPr id="5" name="Rectangle 4">
+            <a:extLst>
+              <a:ext uri="{FF2B5EF4-FFF2-40B4-BE49-F238E27FC236}">
+                <a16:creationId xmlns:a16="http://schemas.microsoft.com/office/drawing/2014/main" id="{BECC5715-81E0-AD2F-9298-7F3DB4ED3E3B}"/>
+              </a:ext>
+            </a:extLst>
+          </p:cNvPr>
+          <p:cNvSpPr/>
+          <p:nvPr/>
+        </p:nvSpPr>
+        <p:spPr>
+          <a:xfrm>
+            <a:off x="9280725" y="3508245"/>
             <a:ext cx="1849243" cy="743414"/>
           </a:xfrm>
           <a:prstGeom prst="rect">
@@ -3987,7 +5456,7 @@
             </a:pPr>
             <a:r>
               <a:rPr lang="en-US" sz="1600" dirty="0"/>
-              <a:t>Match Axis Orientation as shown (Use Flip)</a:t>
+              <a:t>Match Axis Orientation as shown on next slides (Use Flip)</a:t>
             </a:r>
           </a:p>
           <a:p>
@@ -3997,7 +5466,7 @@
             </a:pPr>
             <a:r>
               <a:rPr lang="en-US" sz="1600" dirty="0"/>
-              <a:t>X axis set normal  to profile</a:t>
+              <a:t>X axis set normal to cutter face</a:t>
             </a:r>
           </a:p>
           <a:p>
@@ -4007,7 +5476,7 @@
             </a:pPr>
             <a:r>
               <a:rPr lang="en-US" sz="1600" dirty="0"/>
-              <a:t>Y axis normal to face</a:t>
+              <a:t>Y axis pointing to right when looking into X axis with Z axis pointing up</a:t>
             </a:r>
           </a:p>
           <a:p>
@@ -4017,46 +5486,12 @@
             </a:pPr>
             <a:r>
               <a:rPr lang="en-US" sz="1600" dirty="0"/>
-              <a:t>Z axis to right when looking at face</a:t>
-            </a:r>
-          </a:p>
-          <a:p>
-            <a:pPr marL="342900" indent="-342900">
-              <a:buAutoNum type="arabicPeriod"/>
-            </a:pPr>
-            <a:endParaRPr lang="en-US" sz="1600" dirty="0"/>
-          </a:p>
-        </p:txBody>
-      </p:sp>
-      <p:pic>
-        <p:nvPicPr>
-          <p:cNvPr id="5" name="Picture 4" descr="A computer generated image of a cylinder&#10;&#10;Description automatically generated">
-            <a:extLst>
-              <a:ext uri="{FF2B5EF4-FFF2-40B4-BE49-F238E27FC236}">
-                <a16:creationId xmlns:a16="http://schemas.microsoft.com/office/drawing/2014/main" id="{5765FC7B-9EBF-5245-5A22-44D2599BD9AF}"/>
-              </a:ext>
-            </a:extLst>
-          </p:cNvPr>
-          <p:cNvPicPr>
-            <a:picLocks noChangeAspect="1"/>
-          </p:cNvPicPr>
-          <p:nvPr/>
-        </p:nvPicPr>
-        <p:blipFill rotWithShape="1">
-          <a:blip r:embed="rId2"/>
-          <a:srcRect l="8191" t="3324" r="13166" b="218"/>
-          <a:stretch/>
-        </p:blipFill>
-        <p:spPr>
-          <a:xfrm>
-            <a:off x="7753050" y="290453"/>
-            <a:ext cx="4285173" cy="4105323"/>
-          </a:xfrm>
-          <a:prstGeom prst="rect">
-            <a:avLst/>
-          </a:prstGeom>
-        </p:spPr>
-      </p:pic>
+              <a:t>Z axis set normal to cutting contact point</a:t>
+            </a:r>
+            <a:endParaRPr lang="en-US"/>
+          </a:p>
+        </p:txBody>
+      </p:sp>
       <p:pic>
         <p:nvPicPr>
           <p:cNvPr id="4" name="Picture 3" descr="A screenshot of a computer&#10;&#10;Description automatically generated">
@@ -4072,14 +5507,14 @@
           <p:nvPr/>
         </p:nvPicPr>
         <p:blipFill>
-          <a:blip r:embed="rId3"/>
+          <a:blip r:embed="rId2"/>
           <a:stretch>
             <a:fillRect/>
           </a:stretch>
         </p:blipFill>
         <p:spPr>
           <a:xfrm>
-            <a:off x="4774232" y="3310170"/>
+            <a:off x="7546007" y="3081570"/>
             <a:ext cx="3712195" cy="3425052"/>
           </a:xfrm>
           <a:prstGeom prst="rect">
@@ -4119,10 +5554,10 @@
       </p:grpSpPr>
       <p:pic>
         <p:nvPicPr>
-          <p:cNvPr id="5" name="Picture 4" descr="A computer generated image of a cylinder&#10;&#10;Description automatically generated">
+          <p:cNvPr id="3" name="Picture 2">
             <a:extLst>
               <a:ext uri="{FF2B5EF4-FFF2-40B4-BE49-F238E27FC236}">
-                <a16:creationId xmlns:a16="http://schemas.microsoft.com/office/drawing/2014/main" id="{5765FC7B-9EBF-5245-5A22-44D2599BD9AF}"/>
+                <a16:creationId xmlns:a16="http://schemas.microsoft.com/office/drawing/2014/main" id="{F48C23A1-CB55-51BF-75CA-454EBAB2131D}"/>
               </a:ext>
             </a:extLst>
           </p:cNvPr>
@@ -4131,15 +5566,16 @@
           </p:cNvPicPr>
           <p:nvPr/>
         </p:nvPicPr>
-        <p:blipFill rotWithShape="1">
+        <p:blipFill>
           <a:blip r:embed="rId2"/>
-          <a:srcRect l="8191" t="3324" r="13166" b="218"/>
-          <a:stretch/>
+          <a:stretch>
+            <a:fillRect/>
+          </a:stretch>
         </p:blipFill>
         <p:spPr>
           <a:xfrm>
-            <a:off x="2793805" y="252978"/>
-            <a:ext cx="6608648" cy="6341355"/>
+            <a:off x="2708703" y="625944"/>
+            <a:ext cx="6774592" cy="5616405"/>
           </a:xfrm>
           <a:prstGeom prst="rect">
             <a:avLst/>
@@ -4176,44 +5612,141 @@
           <a:chExt cx="0" cy="0"/>
         </a:xfrm>
       </p:grpSpPr>
-      <p:sp>
-        <p:nvSpPr>
-          <p:cNvPr id="2" name="Title 1">
+      <p:pic>
+        <p:nvPicPr>
+          <p:cNvPr id="2" name="Picture 1" descr="A drawing of a cylinder&#10;&#10;Description automatically generated">
             <a:extLst>
               <a:ext uri="{FF2B5EF4-FFF2-40B4-BE49-F238E27FC236}">
-                <a16:creationId xmlns:a16="http://schemas.microsoft.com/office/drawing/2014/main" id="{16055984-C5B8-5B84-88F9-FBAD33C2F368}"/>
+                <a16:creationId xmlns:a16="http://schemas.microsoft.com/office/drawing/2014/main" id="{E550080C-7591-11F4-B8DA-3DE8029CE8D5}"/>
               </a:ext>
             </a:extLst>
           </p:cNvPr>
-          <p:cNvSpPr>
-            <a:spLocks noGrp="1"/>
-          </p:cNvSpPr>
-          <p:nvPr>
-            <p:ph type="title"/>
-          </p:nvPr>
-        </p:nvSpPr>
+          <p:cNvPicPr>
+            <a:picLocks noChangeAspect="1"/>
+          </p:cNvPicPr>
+          <p:nvPr/>
+        </p:nvPicPr>
+        <p:blipFill>
+          <a:blip r:embed="rId2"/>
+          <a:stretch>
+            <a:fillRect/>
+          </a:stretch>
+        </p:blipFill>
         <p:spPr>
           <a:xfrm>
-            <a:off x="838200" y="2769366"/>
-            <a:ext cx="10515600" cy="1325563"/>
+            <a:off x="268851" y="226540"/>
+            <a:ext cx="5826030" cy="4592596"/>
           </a:xfrm>
+          <a:prstGeom prst="rect">
+            <a:avLst/>
+          </a:prstGeom>
         </p:spPr>
-        <p:txBody>
-          <a:bodyPr/>
-          <a:lstStyle/>
-          <a:p>
-            <a:pPr algn="ctr"/>
-            <a:r>
-              <a:rPr lang="en-US" dirty="0"/>
-              <a:t>Last Slide</a:t>
-            </a:r>
-          </a:p>
-        </p:txBody>
-      </p:sp>
+      </p:pic>
+      <p:pic>
+        <p:nvPicPr>
+          <p:cNvPr id="4" name="Picture 3" descr="A grey cylinder with a grey circle&#10;&#10;Description automatically generated">
+            <a:extLst>
+              <a:ext uri="{FF2B5EF4-FFF2-40B4-BE49-F238E27FC236}">
+                <a16:creationId xmlns:a16="http://schemas.microsoft.com/office/drawing/2014/main" id="{72127ED3-17D6-977F-AD47-09BB5A0F64E1}"/>
+              </a:ext>
+            </a:extLst>
+          </p:cNvPr>
+          <p:cNvPicPr>
+            <a:picLocks noChangeAspect="1"/>
+          </p:cNvPicPr>
+          <p:nvPr/>
+        </p:nvPicPr>
+        <p:blipFill>
+          <a:blip r:embed="rId3"/>
+          <a:stretch>
+            <a:fillRect/>
+          </a:stretch>
+        </p:blipFill>
+        <p:spPr>
+          <a:xfrm>
+            <a:off x="6223500" y="2007973"/>
+            <a:ext cx="5820408" cy="4592595"/>
+          </a:xfrm>
+          <a:prstGeom prst="rect">
+            <a:avLst/>
+          </a:prstGeom>
+        </p:spPr>
+      </p:pic>
     </p:spTree>
     <p:extLst>
       <p:ext uri="{BB962C8B-B14F-4D97-AF65-F5344CB8AC3E}">
-        <p14:creationId xmlns:p14="http://schemas.microsoft.com/office/powerpoint/2010/main" val="3614653100"/>
+        <p14:creationId xmlns:p14="http://schemas.microsoft.com/office/powerpoint/2010/main" val="866400033"/>
+      </p:ext>
+    </p:extLst>
+  </p:cSld>
+  <p:clrMapOvr>
+    <a:masterClrMapping/>
+  </p:clrMapOvr>
+</p:sld>
+</file>
+
+<file path=ppt/slides/slide9.xml><?xml version="1.0" encoding="utf-8"?>
+<p:sld xmlns:a="http://schemas.openxmlformats.org/drawingml/2006/main" xmlns:r="http://schemas.openxmlformats.org/officeDocument/2006/relationships" xmlns:p="http://schemas.openxmlformats.org/presentationml/2006/main">
+  <p:cSld>
+    <p:spTree>
+      <p:nvGrpSpPr>
+        <p:cNvPr id="1" name=""/>
+        <p:cNvGrpSpPr/>
+        <p:nvPr/>
+      </p:nvGrpSpPr>
+      <p:grpSpPr>
+        <a:xfrm>
+          <a:off x="0" y="0"/>
+          <a:ext cx="0" cy="0"/>
+          <a:chOff x="0" y="0"/>
+          <a:chExt cx="0" cy="0"/>
+        </a:xfrm>
+      </p:grpSpPr>
+      <p:sp>
+        <p:nvSpPr>
+          <p:cNvPr id="2" name="Title 1"/>
+          <p:cNvSpPr>
+            <a:spLocks noGrp="1"/>
+          </p:cNvSpPr>
+          <p:nvPr>
+            <p:ph type="ctrTitle"/>
+          </p:nvPr>
+        </p:nvSpPr>
+        <p:spPr/>
+        <p:txBody>
+          <a:bodyPr/>
+          <a:lstStyle/>
+          <a:p>
+            <a:r>
+              <a:rPr lang="en-US" dirty="0"/>
+              <a:t>Tagging</a:t>
+            </a:r>
+          </a:p>
+        </p:txBody>
+      </p:sp>
+      <p:sp>
+        <p:nvSpPr>
+          <p:cNvPr id="3" name="Subtitle 2"/>
+          <p:cNvSpPr>
+            <a:spLocks noGrp="1"/>
+          </p:cNvSpPr>
+          <p:nvPr>
+            <p:ph type="subTitle" idx="1"/>
+          </p:nvPr>
+        </p:nvSpPr>
+        <p:spPr/>
+        <p:txBody>
+          <a:bodyPr/>
+          <a:lstStyle/>
+          <a:p>
+            <a:endParaRPr lang="en-US"/>
+          </a:p>
+        </p:txBody>
+      </p:sp>
+    </p:spTree>
+    <p:extLst>
+      <p:ext uri="{BB962C8B-B14F-4D97-AF65-F5344CB8AC3E}">
+        <p14:creationId xmlns:p14="http://schemas.microsoft.com/office/powerpoint/2010/main" val="3310921234"/>
       </p:ext>
     </p:extLst>
   </p:cSld>

</xml_diff>